<commit_message>
Refine masking training deck with measurement workflow
</commit_message>
<xml_diff>
--- a/HearSim_マスキング訓練プレゼン.pptx
+++ b/HearSim_マスキング訓練プレゼン.pptx
@@ -2045,7 +2045,7 @@
                   <a:srgbClr val="374151"/>
                 </a:solidFill>
               </a:rPr>
-              <a:t>臨床現場を再現したAI症例生成とマスキング訓練プラットフォーム</a:t>
+              <a:t>AI症例生成からマスキング判断までを一気通貫で学習するプラットフォーム</a:t>
             </a:r>
             <a:endParaRPr lang="en-US" sz="1600" dirty="0"/>
           </a:p>
@@ -2149,7 +2149,7 @@
                   <a:srgbClr val="1F2937"/>
                 </a:solidFill>
               </a:rPr>
-              <a:t>システム構成（Mermaid）</a:t>
+              <a:t>オーバーマスキング対策</a:t>
             </a:r>
             <a:endParaRPr lang="en-US" sz="3200" dirty="0"/>
           </a:p>
@@ -2185,7 +2185,7 @@
                   <a:srgbClr val="374151"/>
                 </a:solidFill>
               </a:rPr>
-              <a:t>システム構成（Mermaid）</a:t>
+              <a:t>オーバーマスキング対策</a:t>
             </a:r>
             <a:endParaRPr lang="en-US" sz="1600" dirty="0"/>
           </a:p>
@@ -2221,7 +2221,7 @@
                   <a:srgbClr val="374151"/>
                 </a:solidFill>
               </a:rPr>
-              <a:t>flowchart TD</a:t>
+              <a:t>判定</a:t>
             </a:r>
             <a:endParaRPr lang="en-US" sz="1600" dirty="0"/>
           </a:p>
@@ -2248,6 +2248,80 @@
           <a:bodyPr wrap="square" rtlCol="0" anchor="ctr"/>
           <a:lstStyle/>
           <a:p>
+            <a:pPr algn="l" marL="342900" indent="-342900">
+              <a:buSzPct val="100000"/>
+              <a:buChar char="•"/>
+            </a:pPr>
+            <a:r>
+              <a:rPr lang="en-US" sz="1600" dirty="0">
+                <a:solidFill>
+                  <a:srgbClr val="374151"/>
+                </a:solidFill>
+              </a:rPr>
+              <a:t>- マスキングノイズが test ear に漏れ込む兆候</a:t>
+            </a:r>
+            <a:endParaRPr lang="en-US" sz="1600" dirty="0"/>
+          </a:p>
+        </p:txBody>
+      </p:sp>
+      <p:sp>
+        <p:nvSpPr>
+          <p:cNvPr id="6" name="Text 4"/>
+          <p:cNvSpPr/>
+          <p:nvPr/>
+        </p:nvSpPr>
+        <p:spPr>
+          <a:xfrm>
+            <a:off x="731520" y="3017520"/>
+            <a:ext cx="7680960" cy="457200"/>
+          </a:xfrm>
+          <a:prstGeom prst="rect">
+            <a:avLst/>
+          </a:prstGeom>
+          <a:noFill/>
+          <a:ln/>
+        </p:spPr>
+        <p:txBody>
+          <a:bodyPr wrap="square" rtlCol="0" anchor="ctr"/>
+          <a:lstStyle/>
+          <a:p>
+            <a:pPr algn="l" marL="342900" indent="-342900">
+              <a:buSzPct val="100000"/>
+              <a:buChar char="•"/>
+            </a:pPr>
+            <a:r>
+              <a:rPr lang="en-US" sz="1600" dirty="0">
+                <a:solidFill>
+                  <a:srgbClr val="374151"/>
+                </a:solidFill>
+              </a:rPr>
+              <a:t>- 閾値上昇や応答消失を監視</a:t>
+            </a:r>
+            <a:endParaRPr lang="en-US" sz="1600" dirty="0"/>
+          </a:p>
+        </p:txBody>
+      </p:sp>
+      <p:sp>
+        <p:nvSpPr>
+          <p:cNvPr id="7" name="Text 5"/>
+          <p:cNvSpPr/>
+          <p:nvPr/>
+        </p:nvSpPr>
+        <p:spPr>
+          <a:xfrm>
+            <a:off x="731520" y="3474720"/>
+            <a:ext cx="7680960" cy="457200"/>
+          </a:xfrm>
+          <a:prstGeom prst="rect">
+            <a:avLst/>
+          </a:prstGeom>
+          <a:noFill/>
+          <a:ln/>
+        </p:spPr>
+        <p:txBody>
+          <a:bodyPr wrap="square" rtlCol="0" anchor="ctr"/>
+          <a:lstStyle/>
+          <a:p>
             <a:pPr algn="l" indent="0" marL="0">
               <a:buNone/>
             </a:pPr>
@@ -2257,79 +2331,7 @@
                   <a:srgbClr val="374151"/>
                 </a:solidFill>
               </a:rPr>
-              <a:t>  Start[症例生成リクエスト] --&gt;|プロファイル決定| CaseEngine[AI症例生成エンジン]</a:t>
-            </a:r>
-            <a:endParaRPr lang="en-US" sz="1600" dirty="0"/>
-          </a:p>
-        </p:txBody>
-      </p:sp>
-      <p:sp>
-        <p:nvSpPr>
-          <p:cNvPr id="6" name="Text 4"/>
-          <p:cNvSpPr/>
-          <p:nvPr/>
-        </p:nvSpPr>
-        <p:spPr>
-          <a:xfrm>
-            <a:off x="731520" y="3017520"/>
-            <a:ext cx="7680960" cy="457200"/>
-          </a:xfrm>
-          <a:prstGeom prst="rect">
-            <a:avLst/>
-          </a:prstGeom>
-          <a:noFill/>
-          <a:ln/>
-        </p:spPr>
-        <p:txBody>
-          <a:bodyPr wrap="square" rtlCol="0" anchor="ctr"/>
-          <a:lstStyle/>
-          <a:p>
-            <a:pPr algn="l" indent="0" marL="0">
-              <a:buNone/>
-            </a:pPr>
-            <a:r>
-              <a:rPr lang="en-US" sz="1600" dirty="0">
-                <a:solidFill>
-                  <a:srgbClr val="374151"/>
-                </a:solidFill>
-              </a:rPr>
-              <a:t>  CaseEngine --&gt; Audiogram[Audiogram描画]</a:t>
-            </a:r>
-            <a:endParaRPr lang="en-US" sz="1600" dirty="0"/>
-          </a:p>
-        </p:txBody>
-      </p:sp>
-      <p:sp>
-        <p:nvSpPr>
-          <p:cNvPr id="7" name="Text 5"/>
-          <p:cNvSpPr/>
-          <p:nvPr/>
-        </p:nvSpPr>
-        <p:spPr>
-          <a:xfrm>
-            <a:off x="731520" y="3474720"/>
-            <a:ext cx="7680960" cy="457200"/>
-          </a:xfrm>
-          <a:prstGeom prst="rect">
-            <a:avLst/>
-          </a:prstGeom>
-          <a:noFill/>
-          <a:ln/>
-        </p:spPr>
-        <p:txBody>
-          <a:bodyPr wrap="square" rtlCol="0" anchor="ctr"/>
-          <a:lstStyle/>
-          <a:p>
-            <a:pPr algn="l" indent="0" marL="0">
-              <a:buNone/>
-            </a:pPr>
-            <a:r>
-              <a:rPr lang="en-US" sz="1600" dirty="0">
-                <a:solidFill>
-                  <a:srgbClr val="374151"/>
-                </a:solidFill>
-              </a:rPr>
-              <a:t>  Audiogram --&gt; Tests[Tym / ART / DPOAE 自動生成]</a:t>
+              <a:t>対応フロー</a:t>
             </a:r>
             <a:endParaRPr lang="en-US" sz="1600" dirty="0"/>
           </a:p>
@@ -2356,16 +2358,17 @@
           <a:bodyPr wrap="square" rtlCol="0" anchor="ctr"/>
           <a:lstStyle/>
           <a:p>
-            <a:pPr algn="l" indent="0" marL="0">
-              <a:buNone/>
-            </a:pPr>
-            <a:r>
-              <a:rPr lang="en-US" sz="1600" dirty="0">
-                <a:solidFill>
-                  <a:srgbClr val="374151"/>
-                </a:solidFill>
-              </a:rPr>
-              <a:t>  Tests --&gt; MaskingTrainer[マスキング訓練UI]</a:t>
+            <a:pPr algn="l" marL="342900" indent="-342900">
+              <a:buSzPct val="100000"/>
+              <a:buChar char="•"/>
+            </a:pPr>
+            <a:r>
+              <a:rPr lang="en-US" sz="1600" dirty="0">
+                <a:solidFill>
+                  <a:srgbClr val="374151"/>
+                </a:solidFill>
+              </a:rPr>
+              <a:t>- マスキングレベルを段階的に減少</a:t>
             </a:r>
             <a:endParaRPr lang="en-US" sz="1600" dirty="0"/>
           </a:p>
@@ -2392,16 +2395,17 @@
           <a:bodyPr wrap="square" rtlCol="0" anchor="ctr"/>
           <a:lstStyle/>
           <a:p>
-            <a:pPr algn="l" indent="0" marL="0">
-              <a:buNone/>
-            </a:pPr>
-            <a:r>
-              <a:rPr lang="en-US" sz="1600" dirty="0">
-                <a:solidFill>
-                  <a:srgbClr val="374151"/>
-                </a:solidFill>
-              </a:rPr>
-              <a:t>  MaskingTrainer --&gt; Feedback[答え合わせ・フィードバック]</a:t>
+            <a:pPr algn="l" marL="342900" indent="-342900">
+              <a:buSzPct val="100000"/>
+              <a:buChar char="•"/>
+            </a:pPr>
+            <a:r>
+              <a:rPr lang="en-US" sz="1600" dirty="0">
+                <a:solidFill>
+                  <a:srgbClr val="374151"/>
+                </a:solidFill>
+              </a:rPr>
+              <a:t>- 再測定で閾値を再確認</a:t>
             </a:r>
             <a:endParaRPr lang="en-US" sz="1600" dirty="0"/>
           </a:p>
@@ -2428,16 +2432,17 @@
           <a:bodyPr wrap="square" rtlCol="0" anchor="ctr"/>
           <a:lstStyle/>
           <a:p>
-            <a:pPr algn="l" indent="0" marL="0">
-              <a:buNone/>
-            </a:pPr>
-            <a:r>
-              <a:rPr lang="en-US" sz="1600" dirty="0">
-                <a:solidFill>
-                  <a:srgbClr val="374151"/>
-                </a:solidFill>
-              </a:rPr>
-              <a:t>  Feedback --&gt; LogStore[学習ログ管理]</a:t>
+            <a:pPr algn="l" marL="342900" indent="-342900">
+              <a:buSzPct val="100000"/>
+              <a:buChar char="•"/>
+            </a:pPr>
+            <a:r>
+              <a:rPr lang="en-US" sz="1600" dirty="0">
+                <a:solidFill>
+                  <a:srgbClr val="374151"/>
+                </a:solidFill>
+              </a:rPr>
+              <a:t>- ルールに沿った最適値を提案</a:t>
             </a:r>
             <a:endParaRPr lang="en-US" sz="1600" dirty="0"/>
           </a:p>
@@ -2446,42 +2451,6 @@
       <p:sp>
         <p:nvSpPr>
           <p:cNvPr id="11" name="Text 9"/>
-          <p:cNvSpPr/>
-          <p:nvPr/>
-        </p:nvSpPr>
-        <p:spPr>
-          <a:xfrm>
-            <a:off x="731520" y="5303520"/>
-            <a:ext cx="7315200" cy="548640"/>
-          </a:xfrm>
-          <a:prstGeom prst="rect">
-            <a:avLst/>
-          </a:prstGeom>
-          <a:noFill/>
-          <a:ln/>
-        </p:spPr>
-        <p:txBody>
-          <a:bodyPr wrap="square" rtlCol="0" anchor="ctr"/>
-          <a:lstStyle/>
-          <a:p>
-            <a:pPr indent="0" marL="0">
-              <a:buNone/>
-            </a:pPr>
-            <a:r>
-              <a:rPr lang="en-US" sz="1600" i="1" dirty="0">
-                <a:solidFill>
-                  <a:srgbClr val="2563EB"/>
-                </a:solidFill>
-              </a:rPr>
-              <a:t>Mermaid 図は資料参照</a:t>
-            </a:r>
-            <a:endParaRPr lang="en-US" sz="1600" dirty="0"/>
-          </a:p>
-        </p:txBody>
-      </p:sp>
-      <p:sp>
-        <p:nvSpPr>
-          <p:cNvPr id="12" name="Text 10"/>
           <p:cNvSpPr/>
           <p:nvPr/>
         </p:nvSpPr>
@@ -2577,7 +2546,7 @@
                   <a:srgbClr val="1F2937"/>
                 </a:solidFill>
               </a:rPr>
-              <a:t>導入・展開シナリオ</a:t>
+              <a:t>全体フローチャート</a:t>
             </a:r>
             <a:endParaRPr lang="en-US" sz="3200" dirty="0"/>
           </a:p>
@@ -2613,7 +2582,7 @@
                   <a:srgbClr val="374151"/>
                 </a:solidFill>
               </a:rPr>
-              <a:t>導入・展開シナリオ</a:t>
+              <a:t>全体フローチャート</a:t>
             </a:r>
             <a:endParaRPr lang="en-US" sz="1600" dirty="0"/>
           </a:p>
@@ -2649,7 +2618,7 @@
                   <a:srgbClr val="374151"/>
                 </a:solidFill>
               </a:rPr>
-              <a:t>主な利用先</a:t>
+              <a:t>flowchart TD</a:t>
             </a:r>
             <a:endParaRPr lang="en-US" sz="1600" dirty="0"/>
           </a:p>
@@ -2676,17 +2645,16 @@
           <a:bodyPr wrap="square" rtlCol="0" anchor="ctr"/>
           <a:lstStyle/>
           <a:p>
-            <a:pPr algn="l" marL="342900" indent="-342900">
-              <a:buSzPct val="100000"/>
-              <a:buChar char="•"/>
-            </a:pPr>
-            <a:r>
-              <a:rPr lang="en-US" sz="1600" dirty="0">
-                <a:solidFill>
-                  <a:srgbClr val="374151"/>
-                </a:solidFill>
-              </a:rPr>
-              <a:t>- 大学・専門学校の聴覚検査実習</a:t>
+            <a:pPr algn="l" indent="0" marL="0">
+              <a:buNone/>
+            </a:pPr>
+            <a:r>
+              <a:rPr lang="en-US" sz="1600" dirty="0">
+                <a:solidFill>
+                  <a:srgbClr val="374151"/>
+                </a:solidFill>
+              </a:rPr>
+              <a:t>  Start[AI症例生成] --&gt; ACGen[AC初期値・補助検査生成]</a:t>
             </a:r>
             <a:endParaRPr lang="en-US" sz="1600" dirty="0"/>
           </a:p>
@@ -2713,17 +2681,16 @@
           <a:bodyPr wrap="square" rtlCol="0" anchor="ctr"/>
           <a:lstStyle/>
           <a:p>
-            <a:pPr algn="l" marL="342900" indent="-342900">
-              <a:buSzPct val="100000"/>
-              <a:buChar char="•"/>
-            </a:pPr>
-            <a:r>
-              <a:rPr lang="en-US" sz="1600" dirty="0">
-                <a:solidFill>
-                  <a:srgbClr val="374151"/>
-                </a:solidFill>
-              </a:rPr>
-              <a:t>- 医療機関の新人研修やリカレント教育</a:t>
+            <a:pPr algn="l" indent="0" marL="0">
+              <a:buNone/>
+            </a:pPr>
+            <a:r>
+              <a:rPr lang="en-US" sz="1600" dirty="0">
+                <a:solidFill>
+                  <a:srgbClr val="374151"/>
+                </a:solidFill>
+              </a:rPr>
+              <a:t>  ACGen --&gt; ACMeasure[AC測定 5dB下降法]</a:t>
             </a:r>
             <a:endParaRPr lang="en-US" sz="1600" dirty="0"/>
           </a:p>
@@ -2750,17 +2717,16 @@
           <a:bodyPr wrap="square" rtlCol="0" anchor="ctr"/>
           <a:lstStyle/>
           <a:p>
-            <a:pPr algn="l" marL="342900" indent="-342900">
-              <a:buSzPct val="100000"/>
-              <a:buChar char="•"/>
-            </a:pPr>
-            <a:r>
-              <a:rPr lang="en-US" sz="1600" dirty="0">
-                <a:solidFill>
-                  <a:srgbClr val="374151"/>
-                </a:solidFill>
-              </a:rPr>
-              <a:t>- 個人学習者の資格試験対策</a:t>
+            <a:pPr algn="l" indent="0" marL="0">
+              <a:buNone/>
+            </a:pPr>
+            <a:r>
+              <a:rPr lang="en-US" sz="1600" dirty="0">
+                <a:solidFill>
+                  <a:srgbClr val="374151"/>
+                </a:solidFill>
+              </a:rPr>
+              <a:t>  ACMeasure --&gt; BCMeasure[BC測定とABG管理]</a:t>
             </a:r>
             <a:endParaRPr lang="en-US" sz="1600" dirty="0"/>
           </a:p>
@@ -2796,7 +2762,7 @@
                   <a:srgbClr val="374151"/>
                 </a:solidFill>
               </a:rPr>
-              <a:t>ビジネスモデル例</a:t>
+              <a:t>  BCMeasure --&gt; MaskCheck[マスキング要否判定]</a:t>
             </a:r>
             <a:endParaRPr lang="en-US" sz="1600" dirty="0"/>
           </a:p>
@@ -2823,17 +2789,16 @@
           <a:bodyPr wrap="square" rtlCol="0" anchor="ctr"/>
           <a:lstStyle/>
           <a:p>
-            <a:pPr algn="l" marL="342900" indent="-342900">
-              <a:buSzPct val="100000"/>
-              <a:buChar char="•"/>
-            </a:pPr>
-            <a:r>
-              <a:rPr lang="en-US" sz="1600" dirty="0">
-                <a:solidFill>
-                  <a:srgbClr val="374151"/>
-                </a:solidFill>
-              </a:rPr>
-              <a:t>- 教育機関向け年間ライセンス</a:t>
+            <a:pPr algn="l" indent="0" marL="0">
+              <a:buNone/>
+            </a:pPr>
+            <a:r>
+              <a:rPr lang="en-US" sz="1600" dirty="0">
+                <a:solidFill>
+                  <a:srgbClr val="374151"/>
+                </a:solidFill>
+              </a:rPr>
+              <a:t>  MaskCheck --&gt;|必要| MaskCalc[マスキング量算出]</a:t>
             </a:r>
             <a:endParaRPr lang="en-US" sz="1600" dirty="0"/>
           </a:p>
@@ -2860,17 +2825,16 @@
           <a:bodyPr wrap="square" rtlCol="0" anchor="ctr"/>
           <a:lstStyle/>
           <a:p>
-            <a:pPr algn="l" marL="342900" indent="-342900">
-              <a:buSzPct val="100000"/>
-              <a:buChar char="•"/>
-            </a:pPr>
-            <a:r>
-              <a:rPr lang="en-US" sz="1600" dirty="0">
-                <a:solidFill>
-                  <a:srgbClr val="374151"/>
-                </a:solidFill>
-              </a:rPr>
-              <a:t>- 医療機関向け施設パッケージ</a:t>
+            <a:pPr algn="l" indent="0" marL="0">
+              <a:buNone/>
+            </a:pPr>
+            <a:r>
+              <a:rPr lang="en-US" sz="1600" dirty="0">
+                <a:solidFill>
+                  <a:srgbClr val="374151"/>
+                </a:solidFill>
+              </a:rPr>
+              <a:t>  MaskCalc --&gt; ApplyMask[マスキング適用と再測定]</a:t>
             </a:r>
             <a:endParaRPr lang="en-US" sz="1600" dirty="0"/>
           </a:p>
@@ -2897,17 +2861,16 @@
           <a:bodyPr wrap="square" rtlCol="0" anchor="ctr"/>
           <a:lstStyle/>
           <a:p>
-            <a:pPr algn="l" marL="342900" indent="-342900">
-              <a:buSzPct val="100000"/>
-              <a:buChar char="•"/>
-            </a:pPr>
-            <a:r>
-              <a:rPr lang="en-US" sz="1600" dirty="0">
-                <a:solidFill>
-                  <a:srgbClr val="374151"/>
-                </a:solidFill>
-              </a:rPr>
-              <a:t>- 個人向けサブスクリプション＋症例パック</a:t>
+            <a:pPr algn="l" indent="0" marL="0">
+              <a:buNone/>
+            </a:pPr>
+            <a:r>
+              <a:rPr lang="en-US" sz="1600" dirty="0">
+                <a:solidFill>
+                  <a:srgbClr val="374151"/>
+                </a:solidFill>
+              </a:rPr>
+              <a:t>  ApplyMask --&gt; CrossCheck[クロスヒアリング検出]</a:t>
             </a:r>
             <a:endParaRPr lang="en-US" sz="1600" dirty="0"/>
           </a:p>
@@ -2916,6 +2879,114 @@
       <p:sp>
         <p:nvSpPr>
           <p:cNvPr id="12" name="Text 10"/>
+          <p:cNvSpPr/>
+          <p:nvPr/>
+        </p:nvSpPr>
+        <p:spPr>
+          <a:xfrm>
+            <a:off x="731520" y="5760720"/>
+            <a:ext cx="7680960" cy="457200"/>
+          </a:xfrm>
+          <a:prstGeom prst="rect">
+            <a:avLst/>
+          </a:prstGeom>
+          <a:noFill/>
+          <a:ln/>
+        </p:spPr>
+        <p:txBody>
+          <a:bodyPr wrap="square" rtlCol="0" anchor="ctr"/>
+          <a:lstStyle/>
+          <a:p>
+            <a:pPr algn="l" indent="0" marL="0">
+              <a:buNone/>
+            </a:pPr>
+            <a:r>
+              <a:rPr lang="en-US" sz="1600" dirty="0">
+                <a:solidFill>
+                  <a:srgbClr val="374151"/>
+                </a:solidFill>
+              </a:rPr>
+              <a:t>  CrossCheck --&gt; OverMask[オーバーマスキング監視]</a:t>
+            </a:r>
+            <a:endParaRPr lang="en-US" sz="1600" dirty="0"/>
+          </a:p>
+        </p:txBody>
+      </p:sp>
+      <p:sp>
+        <p:nvSpPr>
+          <p:cNvPr id="13" name="Text 11"/>
+          <p:cNvSpPr/>
+          <p:nvPr/>
+        </p:nvSpPr>
+        <p:spPr>
+          <a:xfrm>
+            <a:off x="731520" y="6217920"/>
+            <a:ext cx="7680960" cy="457200"/>
+          </a:xfrm>
+          <a:prstGeom prst="rect">
+            <a:avLst/>
+          </a:prstGeom>
+          <a:noFill/>
+          <a:ln/>
+        </p:spPr>
+        <p:txBody>
+          <a:bodyPr wrap="square" rtlCol="0" anchor="ctr"/>
+          <a:lstStyle/>
+          <a:p>
+            <a:pPr algn="l" indent="0" marL="0">
+              <a:buNone/>
+            </a:pPr>
+            <a:r>
+              <a:rPr lang="en-US" sz="1600" dirty="0">
+                <a:solidFill>
+                  <a:srgbClr val="374151"/>
+                </a:solidFill>
+              </a:rPr>
+              <a:t>  OverMask --&gt; ResultCheck[結果照合・ログ保存]</a:t>
+            </a:r>
+            <a:endParaRPr lang="en-US" sz="1600" dirty="0"/>
+          </a:p>
+        </p:txBody>
+      </p:sp>
+      <p:sp>
+        <p:nvSpPr>
+          <p:cNvPr id="14" name="Text 12"/>
+          <p:cNvSpPr/>
+          <p:nvPr/>
+        </p:nvSpPr>
+        <p:spPr>
+          <a:xfrm>
+            <a:off x="731520" y="6675120"/>
+            <a:ext cx="7315200" cy="548640"/>
+          </a:xfrm>
+          <a:prstGeom prst="rect">
+            <a:avLst/>
+          </a:prstGeom>
+          <a:noFill/>
+          <a:ln/>
+        </p:spPr>
+        <p:txBody>
+          <a:bodyPr wrap="square" rtlCol="0" anchor="ctr"/>
+          <a:lstStyle/>
+          <a:p>
+            <a:pPr indent="0" marL="0">
+              <a:buNone/>
+            </a:pPr>
+            <a:r>
+              <a:rPr lang="en-US" sz="1600" i="1" dirty="0">
+                <a:solidFill>
+                  <a:srgbClr val="2563EB"/>
+                </a:solidFill>
+              </a:rPr>
+              <a:t>Mermaid 図は資料参照</a:t>
+            </a:r>
+            <a:endParaRPr lang="en-US" sz="1600" dirty="0"/>
+          </a:p>
+        </p:txBody>
+      </p:sp>
+      <p:sp>
+        <p:nvSpPr>
+          <p:cNvPr id="15" name="Text 13"/>
           <p:cNvSpPr/>
           <p:nvPr/>
         </p:nvSpPr>
@@ -3011,7 +3082,7 @@
                   <a:srgbClr val="1F2937"/>
                 </a:solidFill>
               </a:rPr>
-              <a:t>開発状況とロードマップ</a:t>
+              <a:t>UIとフィードバック</a:t>
             </a:r>
             <a:endParaRPr lang="en-US" sz="3200" dirty="0"/>
           </a:p>
@@ -3047,7 +3118,7 @@
                   <a:srgbClr val="374151"/>
                 </a:solidFill>
               </a:rPr>
-              <a:t>開発状況とロードマップ</a:t>
+              <a:t>UIとフィードバック</a:t>
             </a:r>
             <a:endParaRPr lang="en-US" sz="1600" dirty="0"/>
           </a:p>
@@ -3083,7 +3154,7 @@
                   <a:srgbClr val="374151"/>
                 </a:solidFill>
               </a:rPr>
-              <a:t>現在の実装</a:t>
+              <a:t>学習者画面</a:t>
             </a:r>
             <a:endParaRPr lang="en-US" sz="1600" dirty="0"/>
           </a:p>
@@ -3120,7 +3191,7 @@
                   <a:srgbClr val="374151"/>
                 </a:solidFill>
               </a:rPr>
-              <a:t>- AI症例生成・補助検査自動描画を実装済み</a:t>
+              <a:t>- Audiogram ビュー＋マスキング入力欄</a:t>
             </a:r>
             <a:endParaRPr lang="en-US" sz="1600" dirty="0"/>
           </a:p>
@@ -3157,7 +3228,7 @@
                   <a:srgbClr val="374151"/>
                 </a:solidFill>
               </a:rPr>
-              <a:t>- マスキング訓練UIとフィードバックロジックを実装</a:t>
+              <a:t>- 推奨値・警告表示・アドバイス</a:t>
             </a:r>
             <a:endParaRPr lang="en-US" sz="1600" dirty="0"/>
           </a:p>
@@ -3194,7 +3265,7 @@
                   <a:srgbClr val="374151"/>
                 </a:solidFill>
               </a:rPr>
-              <a:t>- GitHub / Vercel で継続的デプロイ運用</a:t>
+              <a:t>- 補助検査タブ（Tym／ART／DPOAE）</a:t>
             </a:r>
             <a:endParaRPr lang="en-US" sz="1600" dirty="0"/>
           </a:p>
@@ -3230,7 +3301,7 @@
                   <a:srgbClr val="374151"/>
                 </a:solidFill>
               </a:rPr>
-              <a:t>今後の計画</a:t>
+              <a:t>フィードバック機能</a:t>
             </a:r>
             <a:endParaRPr lang="en-US" sz="1600" dirty="0"/>
           </a:p>
@@ -3267,7 +3338,7 @@
                   <a:srgbClr val="374151"/>
                 </a:solidFill>
               </a:rPr>
-              <a:t>- 訓練シナリオの拡充（症例・難易度設定）</a:t>
+              <a:t>- 応答履歴と閾値差分を可視化</a:t>
             </a:r>
             <a:endParaRPr lang="en-US" sz="1600" dirty="0"/>
           </a:p>
@@ -3304,7 +3375,7 @@
                   <a:srgbClr val="374151"/>
                 </a:solidFill>
               </a:rPr>
-              <a:t>- LMS連携・学習分析機能の追加</a:t>
+              <a:t>- 過小／過大の理由をコメント表示</a:t>
             </a:r>
             <a:endParaRPr lang="en-US" sz="1600" dirty="0"/>
           </a:p>
@@ -3341,7 +3412,7 @@
                   <a:srgbClr val="374151"/>
                 </a:solidFill>
               </a:rPr>
-              <a:t>- 実機インターフェース（オージオメータI/O）との接続検証</a:t>
+              <a:t>- 学習ログで苦手傾向を分析</a:t>
             </a:r>
             <a:endParaRPr lang="en-US" sz="1600" dirty="0"/>
           </a:p>
@@ -3445,79 +3516,79 @@
                   <a:srgbClr val="1F2937"/>
                 </a:solidFill>
               </a:rPr>
+              <a:t>まとめと次ステップ</a:t>
+            </a:r>
+            <a:endParaRPr lang="en-US" sz="3200" dirty="0"/>
+          </a:p>
+        </p:txBody>
+      </p:sp>
+      <p:sp>
+        <p:nvSpPr>
+          <p:cNvPr id="3" name="Text 1"/>
+          <p:cNvSpPr/>
+          <p:nvPr/>
+        </p:nvSpPr>
+        <p:spPr>
+          <a:xfrm>
+            <a:off x="731520" y="1645920"/>
+            <a:ext cx="7680960" cy="457200"/>
+          </a:xfrm>
+          <a:prstGeom prst="rect">
+            <a:avLst/>
+          </a:prstGeom>
+          <a:noFill/>
+          <a:ln/>
+        </p:spPr>
+        <p:txBody>
+          <a:bodyPr wrap="square" rtlCol="0" anchor="ctr"/>
+          <a:lstStyle/>
+          <a:p>
+            <a:pPr algn="l" indent="0" marL="0">
+              <a:buNone/>
+            </a:pPr>
+            <a:r>
+              <a:rPr lang="en-US" sz="1600" dirty="0">
+                <a:solidFill>
+                  <a:srgbClr val="374151"/>
+                </a:solidFill>
+              </a:rPr>
+              <a:t>まとめと次ステップ</a:t>
+            </a:r>
+            <a:endParaRPr lang="en-US" sz="1600" dirty="0"/>
+          </a:p>
+        </p:txBody>
+      </p:sp>
+      <p:sp>
+        <p:nvSpPr>
+          <p:cNvPr id="4" name="Text 2"/>
+          <p:cNvSpPr/>
+          <p:nvPr/>
+        </p:nvSpPr>
+        <p:spPr>
+          <a:xfrm>
+            <a:off x="731520" y="2103120"/>
+            <a:ext cx="7680960" cy="457200"/>
+          </a:xfrm>
+          <a:prstGeom prst="rect">
+            <a:avLst/>
+          </a:prstGeom>
+          <a:noFill/>
+          <a:ln/>
+        </p:spPr>
+        <p:txBody>
+          <a:bodyPr wrap="square" rtlCol="0" anchor="ctr"/>
+          <a:lstStyle/>
+          <a:p>
+            <a:pPr algn="l" indent="0" marL="0">
+              <a:buNone/>
+            </a:pPr>
+            <a:r>
+              <a:rPr lang="en-US" sz="1600" dirty="0">
+                <a:solidFill>
+                  <a:srgbClr val="374151"/>
+                </a:solidFill>
+              </a:rPr>
               <a:t>まとめ</a:t>
-            </a:r>
-            <a:endParaRPr lang="en-US" sz="3200" dirty="0"/>
-          </a:p>
-        </p:txBody>
-      </p:sp>
-      <p:sp>
-        <p:nvSpPr>
-          <p:cNvPr id="3" name="Text 1"/>
-          <p:cNvSpPr/>
-          <p:nvPr/>
-        </p:nvSpPr>
-        <p:spPr>
-          <a:xfrm>
-            <a:off x="731520" y="1645920"/>
-            <a:ext cx="7680960" cy="457200"/>
-          </a:xfrm>
-          <a:prstGeom prst="rect">
-            <a:avLst/>
-          </a:prstGeom>
-          <a:noFill/>
-          <a:ln/>
-        </p:spPr>
-        <p:txBody>
-          <a:bodyPr wrap="square" rtlCol="0" anchor="ctr"/>
-          <a:lstStyle/>
-          <a:p>
-            <a:pPr algn="l" indent="0" marL="0">
-              <a:buNone/>
-            </a:pPr>
-            <a:r>
-              <a:rPr lang="en-US" sz="1600" dirty="0">
-                <a:solidFill>
-                  <a:srgbClr val="374151"/>
-                </a:solidFill>
-              </a:rPr>
-              <a:t>まとめ</a:t>
-            </a:r>
-            <a:endParaRPr lang="en-US" sz="1600" dirty="0"/>
-          </a:p>
-        </p:txBody>
-      </p:sp>
-      <p:sp>
-        <p:nvSpPr>
-          <p:cNvPr id="4" name="Text 2"/>
-          <p:cNvSpPr/>
-          <p:nvPr/>
-        </p:nvSpPr>
-        <p:spPr>
-          <a:xfrm>
-            <a:off x="731520" y="2103120"/>
-            <a:ext cx="7680960" cy="457200"/>
-          </a:xfrm>
-          <a:prstGeom prst="rect">
-            <a:avLst/>
-          </a:prstGeom>
-          <a:noFill/>
-          <a:ln/>
-        </p:spPr>
-        <p:txBody>
-          <a:bodyPr wrap="square" rtlCol="0" anchor="ctr"/>
-          <a:lstStyle/>
-          <a:p>
-            <a:pPr algn="l" indent="0" marL="0">
-              <a:buNone/>
-            </a:pPr>
-            <a:r>
-              <a:rPr lang="en-US" sz="1600" dirty="0">
-                <a:solidFill>
-                  <a:srgbClr val="374151"/>
-                </a:solidFill>
-              </a:rPr>
-              <a:t>提供価値</a:t>
             </a:r>
             <a:endParaRPr lang="en-US" sz="1600" dirty="0"/>
           </a:p>
@@ -3554,7 +3625,7 @@
                   <a:srgbClr val="374151"/>
                 </a:solidFill>
               </a:rPr>
-              <a:t>- 臨床ルール準拠のAI擬似患者でマスキング判断を体系学習</a:t>
+              <a:t>- AI 症例生成で臨床的に自然な基礎データを用意</a:t>
             </a:r>
             <a:endParaRPr lang="en-US" sz="1600" dirty="0"/>
           </a:p>
@@ -3591,7 +3662,7 @@
                   <a:srgbClr val="374151"/>
                 </a:solidFill>
               </a:rPr>
-              <a:t>- 補助検査との整合を保ち臨床思考を深める教育体験</a:t>
+              <a:t>- 5dB下降法→マスキング設定→結果照合の一連を反復学習</a:t>
             </a:r>
             <a:endParaRPr lang="en-US" sz="1600" dirty="0"/>
           </a:p>
@@ -3628,7 +3699,7 @@
                   <a:srgbClr val="374151"/>
                 </a:solidFill>
               </a:rPr>
-              <a:t>- 教育・研修・特許戦略に活用可能な先進的プラットフォーム</a:t>
+              <a:t>- クロスヒアリング／オーバーマスキングを計画的に体験</a:t>
             </a:r>
             <a:endParaRPr lang="en-US" sz="1600" dirty="0"/>
           </a:p>
@@ -3664,7 +3735,7 @@
                   <a:srgbClr val="374151"/>
                 </a:solidFill>
               </a:rPr>
-              <a:t>次のアクション</a:t>
+              <a:t>次ステップ</a:t>
             </a:r>
             <a:endParaRPr lang="en-US" sz="1600" dirty="0"/>
           </a:p>
@@ -3701,7 +3772,7 @@
                   <a:srgbClr val="374151"/>
                 </a:solidFill>
               </a:rPr>
-              <a:t>- デモ提供・導入検討先への提案</a:t>
+              <a:t>- 追加シナリオ（重症度・疾患拡張）の投入</a:t>
             </a:r>
             <a:endParaRPr lang="en-US" sz="1600" dirty="0"/>
           </a:p>
@@ -3738,7 +3809,7 @@
                   <a:srgbClr val="374151"/>
                 </a:solidFill>
               </a:rPr>
-              <a:t>- 学習ログ活用による指導者支援機能の設計</a:t>
+              <a:t>- 結果レポートの自動生成</a:t>
             </a:r>
             <a:endParaRPr lang="en-US" sz="1600" dirty="0"/>
           </a:p>
@@ -3775,7 +3846,7 @@
                   <a:srgbClr val="374151"/>
                 </a:solidFill>
               </a:rPr>
-              <a:t>- 特許出願と事業化準備の加速</a:t>
+              <a:t>- LMS/実機連携の検証と導入</a:t>
             </a:r>
             <a:endParaRPr lang="en-US" sz="1600" dirty="0"/>
           </a:p>
@@ -3951,7 +4022,7 @@
                   <a:srgbClr val="374151"/>
                 </a:solidFill>
               </a:rPr>
-              <a:t>AI聴覚シミュレーション・トレーニングプラットフォーム</a:t>
+              <a:t>AI聴覚検査シミュレーション</a:t>
             </a:r>
             <a:endParaRPr lang="en-US" sz="1600" dirty="0"/>
           </a:p>
@@ -3987,7 +4058,7 @@
                   <a:srgbClr val="374151"/>
                 </a:solidFill>
               </a:rPr>
-              <a:t>臨床現場を再現したAI症例生成と聴力検査シミュレーション</a:t>
+              <a:t>自動症例生成からマスキング判断までの統合トレーニング</a:t>
             </a:r>
             <a:endParaRPr lang="en-US" sz="1600" dirty="0"/>
           </a:p>
@@ -4127,7 +4198,7 @@
                   <a:srgbClr val="1F2937"/>
                 </a:solidFill>
               </a:rPr>
-              <a:t>背景と課題</a:t>
+              <a:t>ゴール</a:t>
             </a:r>
             <a:endParaRPr lang="en-US" sz="3200" dirty="0"/>
           </a:p>
@@ -4163,7 +4234,7 @@
                   <a:srgbClr val="374151"/>
                 </a:solidFill>
               </a:rPr>
-              <a:t>背景と課題</a:t>
+              <a:t>ゴール</a:t>
             </a:r>
             <a:endParaRPr lang="en-US" sz="1600" dirty="0"/>
           </a:p>
@@ -4199,7 +4270,7 @@
                   <a:srgbClr val="374151"/>
                 </a:solidFill>
               </a:rPr>
-              <a:t>現場課題</a:t>
+              <a:t>本プレゼンで伝えること</a:t>
             </a:r>
             <a:endParaRPr lang="en-US" sz="1600" dirty="0"/>
           </a:p>
@@ -4236,7 +4307,7 @@
                   <a:srgbClr val="374151"/>
                 </a:solidFill>
               </a:rPr>
-              <a:t>- マスキング値設定は経験依存が大きく習得が難しい</a:t>
+              <a:t>- AI が臨床ルール準拠の擬似症例を自動生成</a:t>
             </a:r>
             <a:endParaRPr lang="en-US" sz="1600" dirty="0"/>
           </a:p>
@@ -4273,7 +4344,7 @@
                   <a:srgbClr val="374151"/>
                 </a:solidFill>
               </a:rPr>
-              <a:t>- 症例データ不足で体系的なトレーニングが困難</a:t>
+              <a:t>- AC/BC 測定→マスキング判定→結果照合までを模擬</a:t>
             </a:r>
             <a:endParaRPr lang="en-US" sz="1600" dirty="0"/>
           </a:p>
@@ -4310,7 +4381,7 @@
                   <a:srgbClr val="374151"/>
                 </a:solidFill>
               </a:rPr>
-              <a:t>- 実機利用は高コスト・場所制約が大きい</a:t>
+              <a:t>- クロスヒアリング／オーバーマスキング判断を反復学習</a:t>
             </a:r>
             <a:endParaRPr lang="en-US" sz="1600" dirty="0"/>
           </a:p>
@@ -4346,7 +4417,7 @@
                   <a:srgbClr val="374151"/>
                 </a:solidFill>
               </a:rPr>
-              <a:t>教育ニーズ</a:t>
+              <a:t>受講者の到達点</a:t>
             </a:r>
             <a:endParaRPr lang="en-US" sz="1600" dirty="0"/>
           </a:p>
@@ -4383,7 +4454,7 @@
                   <a:srgbClr val="374151"/>
                 </a:solidFill>
               </a:rPr>
-              <a:t>- 臨床ルールに沿った擬似症例の大量供給</a:t>
+              <a:t>- マスキング量設定の根拠を言語化できる</a:t>
             </a:r>
             <a:endParaRPr lang="en-US" sz="1600" dirty="0"/>
           </a:p>
@@ -4420,7 +4491,7 @@
                   <a:srgbClr val="374151"/>
                 </a:solidFill>
               </a:rPr>
-              <a:t>- 判断プロセスを可視化する教材</a:t>
+              <a:t>- クロスヒアリング／オーバーマスキングの兆候を説明できる</a:t>
             </a:r>
             <a:endParaRPr lang="en-US" sz="1600" dirty="0"/>
           </a:p>
@@ -4457,7 +4528,7 @@
                   <a:srgbClr val="374151"/>
                 </a:solidFill>
               </a:rPr>
-              <a:t>- ブラウザだけで再現可能な訓練環境</a:t>
+              <a:t>- 結果照合とフィードバックの重要性を理解する</a:t>
             </a:r>
             <a:endParaRPr lang="en-US" sz="1600" dirty="0"/>
           </a:p>
@@ -4561,7 +4632,7 @@
                   <a:srgbClr val="1F2937"/>
                 </a:solidFill>
               </a:rPr>
-              <a:t>ソリューション概要</a:t>
+              <a:t>AI症例自動生成フロー</a:t>
             </a:r>
             <a:endParaRPr lang="en-US" sz="3200" dirty="0"/>
           </a:p>
@@ -4597,7 +4668,7 @@
                   <a:srgbClr val="374151"/>
                 </a:solidFill>
               </a:rPr>
-              <a:t>ソリューション概要</a:t>
+              <a:t>AI症例自動生成フロー</a:t>
             </a:r>
             <a:endParaRPr lang="en-US" sz="1600" dirty="0"/>
           </a:p>
@@ -4633,7 +4704,7 @@
                   <a:srgbClr val="374151"/>
                 </a:solidFill>
               </a:rPr>
-              <a:t>プラットフォームの核</a:t>
+              <a:t>ステップ</a:t>
             </a:r>
             <a:endParaRPr lang="en-US" sz="1600" dirty="0"/>
           </a:p>
@@ -4648,6 +4719,222 @@
         <p:spPr>
           <a:xfrm>
             <a:off x="731520" y="2560320"/>
+            <a:ext cx="7680960" cy="457200"/>
+          </a:xfrm>
+          <a:prstGeom prst="rect">
+            <a:avLst/>
+          </a:prstGeom>
+          <a:noFill/>
+          <a:ln/>
+        </p:spPr>
+        <p:txBody>
+          <a:bodyPr wrap="square" rtlCol="0" anchor="ctr"/>
+          <a:lstStyle/>
+          <a:p>
+            <a:pPr algn="l" indent="0" marL="0">
+              <a:buNone/>
+            </a:pPr>
+            <a:r>
+              <a:rPr lang="en-US" sz="1600" dirty="0">
+                <a:solidFill>
+                  <a:srgbClr val="374151"/>
+                </a:solidFill>
+              </a:rPr>
+              <a:t>1. profile選定（年齢・性別・疾患・重症度）</a:t>
+            </a:r>
+            <a:endParaRPr lang="en-US" sz="1600" dirty="0"/>
+          </a:p>
+        </p:txBody>
+      </p:sp>
+      <p:sp>
+        <p:nvSpPr>
+          <p:cNvPr id="6" name="Text 4"/>
+          <p:cNvSpPr/>
+          <p:nvPr/>
+        </p:nvSpPr>
+        <p:spPr>
+          <a:xfrm>
+            <a:off x="731520" y="3017520"/>
+            <a:ext cx="7680960" cy="457200"/>
+          </a:xfrm>
+          <a:prstGeom prst="rect">
+            <a:avLst/>
+          </a:prstGeom>
+          <a:noFill/>
+          <a:ln/>
+        </p:spPr>
+        <p:txBody>
+          <a:bodyPr wrap="square" rtlCol="0" anchor="ctr"/>
+          <a:lstStyle/>
+          <a:p>
+            <a:pPr algn="l" indent="0" marL="0">
+              <a:buNone/>
+            </a:pPr>
+            <a:r>
+              <a:rPr lang="en-US" sz="1600" dirty="0">
+                <a:solidFill>
+                  <a:srgbClr val="374151"/>
+                </a:solidFill>
+              </a:rPr>
+              <a:t>2. AC 初期値生成（ISO 正常値＋疾患プロファイル補正）</a:t>
+            </a:r>
+            <a:endParaRPr lang="en-US" sz="1600" dirty="0"/>
+          </a:p>
+        </p:txBody>
+      </p:sp>
+      <p:sp>
+        <p:nvSpPr>
+          <p:cNvPr id="7" name="Text 5"/>
+          <p:cNvSpPr/>
+          <p:nvPr/>
+        </p:nvSpPr>
+        <p:spPr>
+          <a:xfrm>
+            <a:off x="731520" y="3474720"/>
+            <a:ext cx="7680960" cy="457200"/>
+          </a:xfrm>
+          <a:prstGeom prst="rect">
+            <a:avLst/>
+          </a:prstGeom>
+          <a:noFill/>
+          <a:ln/>
+        </p:spPr>
+        <p:txBody>
+          <a:bodyPr wrap="square" rtlCol="0" anchor="ctr"/>
+          <a:lstStyle/>
+          <a:p>
+            <a:pPr algn="l" indent="0" marL="0">
+              <a:buNone/>
+            </a:pPr>
+            <a:r>
+              <a:rPr lang="en-US" sz="1600" dirty="0">
+                <a:solidFill>
+                  <a:srgbClr val="374151"/>
+                </a:solidFill>
+              </a:rPr>
+              <a:t>3. BC 生成（±6dB揺らぎ、ABG制約を想定）</a:t>
+            </a:r>
+            <a:endParaRPr lang="en-US" sz="1600" dirty="0"/>
+          </a:p>
+        </p:txBody>
+      </p:sp>
+      <p:sp>
+        <p:nvSpPr>
+          <p:cNvPr id="8" name="Text 6"/>
+          <p:cNvSpPr/>
+          <p:nvPr/>
+        </p:nvSpPr>
+        <p:spPr>
+          <a:xfrm>
+            <a:off x="731520" y="3931920"/>
+            <a:ext cx="7680960" cy="457200"/>
+          </a:xfrm>
+          <a:prstGeom prst="rect">
+            <a:avLst/>
+          </a:prstGeom>
+          <a:noFill/>
+          <a:ln/>
+        </p:spPr>
+        <p:txBody>
+          <a:bodyPr wrap="square" rtlCol="0" anchor="ctr"/>
+          <a:lstStyle/>
+          <a:p>
+            <a:pPr algn="l" indent="0" marL="0">
+              <a:buNone/>
+            </a:pPr>
+            <a:r>
+              <a:rPr lang="en-US" sz="1600" dirty="0">
+                <a:solidFill>
+                  <a:srgbClr val="374151"/>
+                </a:solidFill>
+              </a:rPr>
+              <a:t>4. 補助検査（Tym／ART／DPOAE）を病態ルールで自動設定</a:t>
+            </a:r>
+            <a:endParaRPr lang="en-US" sz="1600" dirty="0"/>
+          </a:p>
+        </p:txBody>
+      </p:sp>
+      <p:sp>
+        <p:nvSpPr>
+          <p:cNvPr id="9" name="Text 7"/>
+          <p:cNvSpPr/>
+          <p:nvPr/>
+        </p:nvSpPr>
+        <p:spPr>
+          <a:xfrm>
+            <a:off x="731520" y="4389120"/>
+            <a:ext cx="7680960" cy="457200"/>
+          </a:xfrm>
+          <a:prstGeom prst="rect">
+            <a:avLst/>
+          </a:prstGeom>
+          <a:noFill/>
+          <a:ln/>
+        </p:spPr>
+        <p:txBody>
+          <a:bodyPr wrap="square" rtlCol="0" anchor="ctr"/>
+          <a:lstStyle/>
+          <a:p>
+            <a:pPr algn="l" indent="0" marL="0">
+              <a:buNone/>
+            </a:pPr>
+            <a:r>
+              <a:rPr lang="en-US" sz="1600" dirty="0">
+                <a:solidFill>
+                  <a:srgbClr val="374151"/>
+                </a:solidFill>
+              </a:rPr>
+              <a:t>5. 整合性チェック（左右差、患側判定、マスキング要件）</a:t>
+            </a:r>
+            <a:endParaRPr lang="en-US" sz="1600" dirty="0"/>
+          </a:p>
+        </p:txBody>
+      </p:sp>
+      <p:sp>
+        <p:nvSpPr>
+          <p:cNvPr id="10" name="Text 8"/>
+          <p:cNvSpPr/>
+          <p:nvPr/>
+        </p:nvSpPr>
+        <p:spPr>
+          <a:xfrm>
+            <a:off x="731520" y="4846320"/>
+            <a:ext cx="7680960" cy="457200"/>
+          </a:xfrm>
+          <a:prstGeom prst="rect">
+            <a:avLst/>
+          </a:prstGeom>
+          <a:noFill/>
+          <a:ln/>
+        </p:spPr>
+        <p:txBody>
+          <a:bodyPr wrap="square" rtlCol="0" anchor="ctr"/>
+          <a:lstStyle/>
+          <a:p>
+            <a:pPr algn="l" indent="0" marL="0">
+              <a:buNone/>
+            </a:pPr>
+            <a:r>
+              <a:rPr lang="en-US" sz="1600" dirty="0">
+                <a:solidFill>
+                  <a:srgbClr val="374151"/>
+                </a:solidFill>
+              </a:rPr>
+              <a:t>特徴</a:t>
+            </a:r>
+            <a:endParaRPr lang="en-US" sz="1600" dirty="0"/>
+          </a:p>
+        </p:txBody>
+      </p:sp>
+      <p:sp>
+        <p:nvSpPr>
+          <p:cNvPr id="11" name="Text 9"/>
+          <p:cNvSpPr/>
+          <p:nvPr/>
+        </p:nvSpPr>
+        <p:spPr>
+          <a:xfrm>
+            <a:off x="731520" y="5303520"/>
             <a:ext cx="7680960" cy="457200"/>
           </a:xfrm>
           <a:prstGeom prst="rect">
@@ -4670,21 +4957,21 @@
                   <a:srgbClr val="374151"/>
                 </a:solidFill>
               </a:rPr>
-              <a:t>- AI が年齢・性別・疾患・重症度を含む擬似患者を自動生成</a:t>
-            </a:r>
-            <a:endParaRPr lang="en-US" sz="1600" dirty="0"/>
-          </a:p>
-        </p:txBody>
-      </p:sp>
-      <p:sp>
-        <p:nvSpPr>
-          <p:cNvPr id="6" name="Text 4"/>
-          <p:cNvSpPr/>
-          <p:nvPr/>
-        </p:nvSpPr>
-        <p:spPr>
-          <a:xfrm>
-            <a:off x="731520" y="3017520"/>
+              <a:t>- 実臨床に近いばらつきとルールを両立</a:t>
+            </a:r>
+            <a:endParaRPr lang="en-US" sz="1600" dirty="0"/>
+          </a:p>
+        </p:txBody>
+      </p:sp>
+      <p:sp>
+        <p:nvSpPr>
+          <p:cNvPr id="12" name="Text 10"/>
+          <p:cNvSpPr/>
+          <p:nvPr/>
+        </p:nvSpPr>
+        <p:spPr>
+          <a:xfrm>
+            <a:off x="731520" y="5760720"/>
             <a:ext cx="7680960" cy="457200"/>
           </a:xfrm>
           <a:prstGeom prst="rect">
@@ -4707,21 +4994,21 @@
                   <a:srgbClr val="374151"/>
                 </a:solidFill>
               </a:rPr>
-              <a:t>- オージオグラム／Tym／ART／DPOAE を一貫した結果として自動構築</a:t>
-            </a:r>
-            <a:endParaRPr lang="en-US" sz="1600" dirty="0"/>
-          </a:p>
-        </p:txBody>
-      </p:sp>
-      <p:sp>
-        <p:nvSpPr>
-          <p:cNvPr id="7" name="Text 5"/>
-          <p:cNvSpPr/>
-          <p:nvPr/>
-        </p:nvSpPr>
-        <p:spPr>
-          <a:xfrm>
-            <a:off x="731520" y="3474720"/>
+              <a:t>- 病態ごとの補助検査結果が一貫している</a:t>
+            </a:r>
+            <a:endParaRPr lang="en-US" sz="1600" dirty="0"/>
+          </a:p>
+        </p:txBody>
+      </p:sp>
+      <p:sp>
+        <p:nvSpPr>
+          <p:cNvPr id="13" name="Text 11"/>
+          <p:cNvSpPr/>
+          <p:nvPr/>
+        </p:nvSpPr>
+        <p:spPr>
+          <a:xfrm>
+            <a:off x="731520" y="6217920"/>
             <a:ext cx="7680960" cy="457200"/>
           </a:xfrm>
           <a:prstGeom prst="rect">
@@ -4744,162 +5031,15 @@
                   <a:srgbClr val="374151"/>
                 </a:solidFill>
               </a:rPr>
-              <a:t>- マスキング値決定の訓練フローを実臨床ルール準拠で再現</a:t>
-            </a:r>
-            <a:endParaRPr lang="en-US" sz="1600" dirty="0"/>
-          </a:p>
-        </p:txBody>
-      </p:sp>
-      <p:sp>
-        <p:nvSpPr>
-          <p:cNvPr id="8" name="Text 6"/>
-          <p:cNvSpPr/>
-          <p:nvPr/>
-        </p:nvSpPr>
-        <p:spPr>
-          <a:xfrm>
-            <a:off x="731520" y="3931920"/>
-            <a:ext cx="7680960" cy="457200"/>
-          </a:xfrm>
-          <a:prstGeom prst="rect">
-            <a:avLst/>
-          </a:prstGeom>
-          <a:noFill/>
-          <a:ln/>
-        </p:spPr>
-        <p:txBody>
-          <a:bodyPr wrap="square" rtlCol="0" anchor="ctr"/>
-          <a:lstStyle/>
-          <a:p>
-            <a:pPr algn="l" indent="0" marL="0">
-              <a:buNone/>
-            </a:pPr>
-            <a:r>
-              <a:rPr lang="en-US" sz="1600" dirty="0">
-                <a:solidFill>
-                  <a:srgbClr val="374151"/>
-                </a:solidFill>
-              </a:rPr>
-              <a:t>期待効果</a:t>
-            </a:r>
-            <a:endParaRPr lang="en-US" sz="1600" dirty="0"/>
-          </a:p>
-        </p:txBody>
-      </p:sp>
-      <p:sp>
-        <p:nvSpPr>
-          <p:cNvPr id="9" name="Text 7"/>
-          <p:cNvSpPr/>
-          <p:nvPr/>
-        </p:nvSpPr>
-        <p:spPr>
-          <a:xfrm>
-            <a:off x="731520" y="4389120"/>
-            <a:ext cx="7680960" cy="457200"/>
-          </a:xfrm>
-          <a:prstGeom prst="rect">
-            <a:avLst/>
-          </a:prstGeom>
-          <a:noFill/>
-          <a:ln/>
-        </p:spPr>
-        <p:txBody>
-          <a:bodyPr wrap="square" rtlCol="0" anchor="ctr"/>
-          <a:lstStyle/>
-          <a:p>
-            <a:pPr algn="l" marL="342900" indent="-342900">
-              <a:buSzPct val="100000"/>
-              <a:buChar char="•"/>
-            </a:pPr>
-            <a:r>
-              <a:rPr lang="en-US" sz="1600" dirty="0">
-                <a:solidFill>
-                  <a:srgbClr val="374151"/>
-                </a:solidFill>
-              </a:rPr>
-              <a:t>- いつでもどこでもマスキング判断を練習</a:t>
-            </a:r>
-            <a:endParaRPr lang="en-US" sz="1600" dirty="0"/>
-          </a:p>
-        </p:txBody>
-      </p:sp>
-      <p:sp>
-        <p:nvSpPr>
-          <p:cNvPr id="10" name="Text 8"/>
-          <p:cNvSpPr/>
-          <p:nvPr/>
-        </p:nvSpPr>
-        <p:spPr>
-          <a:xfrm>
-            <a:off x="731520" y="4846320"/>
-            <a:ext cx="7680960" cy="457200"/>
-          </a:xfrm>
-          <a:prstGeom prst="rect">
-            <a:avLst/>
-          </a:prstGeom>
-          <a:noFill/>
-          <a:ln/>
-        </p:spPr>
-        <p:txBody>
-          <a:bodyPr wrap="square" rtlCol="0" anchor="ctr"/>
-          <a:lstStyle/>
-          <a:p>
-            <a:pPr algn="l" marL="342900" indent="-342900">
-              <a:buSzPct val="100000"/>
-              <a:buChar char="•"/>
-            </a:pPr>
-            <a:r>
-              <a:rPr lang="en-US" sz="1600" dirty="0">
-                <a:solidFill>
-                  <a:srgbClr val="374151"/>
-                </a:solidFill>
-              </a:rPr>
-              <a:t>- 症例の多様性確保で学習効率を向上</a:t>
-            </a:r>
-            <a:endParaRPr lang="en-US" sz="1600" dirty="0"/>
-          </a:p>
-        </p:txBody>
-      </p:sp>
-      <p:sp>
-        <p:nvSpPr>
-          <p:cNvPr id="11" name="Text 9"/>
-          <p:cNvSpPr/>
-          <p:nvPr/>
-        </p:nvSpPr>
-        <p:spPr>
-          <a:xfrm>
-            <a:off x="731520" y="5303520"/>
-            <a:ext cx="7680960" cy="457200"/>
-          </a:xfrm>
-          <a:prstGeom prst="rect">
-            <a:avLst/>
-          </a:prstGeom>
-          <a:noFill/>
-          <a:ln/>
-        </p:spPr>
-        <p:txBody>
-          <a:bodyPr wrap="square" rtlCol="0" anchor="ctr"/>
-          <a:lstStyle/>
-          <a:p>
-            <a:pPr algn="l" marL="342900" indent="-342900">
-              <a:buSzPct val="100000"/>
-              <a:buChar char="•"/>
-            </a:pPr>
-            <a:r>
-              <a:rPr lang="en-US" sz="1600" dirty="0">
-                <a:solidFill>
-                  <a:srgbClr val="374151"/>
-                </a:solidFill>
-              </a:rPr>
-              <a:t>- 臨床思考を伴う教育コンテンツを低コストで提供</a:t>
-            </a:r>
-            <a:endParaRPr lang="en-US" sz="1600" dirty="0"/>
-          </a:p>
-        </p:txBody>
-      </p:sp>
-      <p:sp>
-        <p:nvSpPr>
-          <p:cNvPr id="12" name="Text 10"/>
+              <a:t>- 症例データベースに依存せず無限生成</a:t>
+            </a:r>
+            <a:endParaRPr lang="en-US" sz="1600" dirty="0"/>
+          </a:p>
+        </p:txBody>
+      </p:sp>
+      <p:sp>
+        <p:nvSpPr>
+          <p:cNvPr id="14" name="Text 12"/>
           <p:cNvSpPr/>
           <p:nvPr/>
         </p:nvSpPr>
@@ -4995,7 +5135,7 @@
                   <a:srgbClr val="1F2937"/>
                 </a:solidFill>
               </a:rPr>
-              <a:t>AI症例生成フロー</a:t>
+              <a:t>AC測定プロセス</a:t>
             </a:r>
             <a:endParaRPr lang="en-US" sz="3200" dirty="0"/>
           </a:p>
@@ -5031,7 +5171,7 @@
                   <a:srgbClr val="374151"/>
                 </a:solidFill>
               </a:rPr>
-              <a:t>AI症例生成フロー</a:t>
+              <a:t>AC測定プロセス</a:t>
             </a:r>
             <a:endParaRPr lang="en-US" sz="1600" dirty="0"/>
           </a:p>
@@ -5067,7 +5207,7 @@
                   <a:srgbClr val="374151"/>
                 </a:solidFill>
               </a:rPr>
-              <a:t>自動生成ステップ</a:t>
+              <a:t>操作フロー</a:t>
             </a:r>
             <a:endParaRPr lang="en-US" sz="1600" dirty="0"/>
           </a:p>
@@ -5103,7 +5243,7 @@
                   <a:srgbClr val="374151"/>
                 </a:solidFill>
               </a:rPr>
-              <a:t>1. プロファイル決定（性別・年齢・疾患・重症度）</a:t>
+              <a:t>1. AI症例の AC 初期値を提示</a:t>
             </a:r>
             <a:endParaRPr lang="en-US" sz="1600" dirty="0"/>
           </a:p>
@@ -5139,7 +5279,7 @@
                   <a:srgbClr val="374151"/>
                 </a:solidFill>
               </a:rPr>
-              <a:t>2. AC/BC 閾値生成（BC ±6dB揺らぎ、ABG ルール適合）</a:t>
+              <a:t>2. 測定者が 5dB下降法で閾値を決定</a:t>
             </a:r>
             <a:endParaRPr lang="en-US" sz="1600" dirty="0"/>
           </a:p>
@@ -5175,7 +5315,7 @@
                   <a:srgbClr val="374151"/>
                 </a:solidFill>
               </a:rPr>
-              <a:t>3. 補助検査生成（Tym／ART／DPOAE を病態ルールで設定）</a:t>
+              <a:t>3. 閾値仮決定→ログに記録→次周波数へ</a:t>
             </a:r>
             <a:endParaRPr lang="en-US" sz="1600" dirty="0"/>
           </a:p>
@@ -5211,7 +5351,7 @@
                   <a:srgbClr val="374151"/>
                 </a:solidFill>
               </a:rPr>
-              <a:t>4. 整合性チェック（左右差・患側判定・マスキング条件の確認）</a:t>
+              <a:t>ルール</a:t>
             </a:r>
             <a:endParaRPr lang="en-US" sz="1600" dirty="0"/>
           </a:p>
@@ -5226,42 +5366,6 @@
         <p:spPr>
           <a:xfrm>
             <a:off x="731520" y="4389120"/>
-            <a:ext cx="7680960" cy="457200"/>
-          </a:xfrm>
-          <a:prstGeom prst="rect">
-            <a:avLst/>
-          </a:prstGeom>
-          <a:noFill/>
-          <a:ln/>
-        </p:spPr>
-        <p:txBody>
-          <a:bodyPr wrap="square" rtlCol="0" anchor="ctr"/>
-          <a:lstStyle/>
-          <a:p>
-            <a:pPr algn="l" indent="0" marL="0">
-              <a:buNone/>
-            </a:pPr>
-            <a:r>
-              <a:rPr lang="en-US" sz="1600" dirty="0">
-                <a:solidFill>
-                  <a:srgbClr val="374151"/>
-                </a:solidFill>
-              </a:rPr>
-              <a:t>主要ルール</a:t>
-            </a:r>
-            <a:endParaRPr lang="en-US" sz="1600" dirty="0"/>
-          </a:p>
-        </p:txBody>
-      </p:sp>
-      <p:sp>
-        <p:nvSpPr>
-          <p:cNvPr id="10" name="Text 8"/>
-          <p:cNvSpPr/>
-          <p:nvPr/>
-        </p:nvSpPr>
-        <p:spPr>
-          <a:xfrm>
-            <a:off x="731520" y="4846320"/>
             <a:ext cx="7680960" cy="457200"/>
           </a:xfrm>
           <a:prstGeom prst="rect">
@@ -5284,21 +5388,21 @@
                   <a:srgbClr val="374151"/>
                 </a:solidFill>
               </a:rPr>
-              <a:t>- 正常・SNHL：AC-BC を -10〜+5dB に制約</a:t>
-            </a:r>
-            <a:endParaRPr lang="en-US" sz="1600" dirty="0"/>
-          </a:p>
-        </p:txBody>
-      </p:sp>
-      <p:sp>
-        <p:nvSpPr>
-          <p:cNvPr id="11" name="Text 9"/>
-          <p:cNvSpPr/>
-          <p:nvPr/>
-        </p:nvSpPr>
-        <p:spPr>
-          <a:xfrm>
-            <a:off x="731520" y="5303520"/>
+              <a:t>- ISO 基準に合わせた提示レベル範囲</a:t>
+            </a:r>
+            <a:endParaRPr lang="en-US" sz="1600" dirty="0"/>
+          </a:p>
+        </p:txBody>
+      </p:sp>
+      <p:sp>
+        <p:nvSpPr>
+          <p:cNvPr id="10" name="Text 8"/>
+          <p:cNvSpPr/>
+          <p:nvPr/>
+        </p:nvSpPr>
+        <p:spPr>
+          <a:xfrm>
+            <a:off x="731520" y="4846320"/>
             <a:ext cx="7680960" cy="457200"/>
           </a:xfrm>
           <a:prstGeom prst="rect">
@@ -5321,21 +5425,21 @@
                   <a:srgbClr val="374151"/>
                 </a:solidFill>
               </a:rPr>
-              <a:t>- CHL：ABG 最大40dB、疾患別に最小ABGを確保</a:t>
-            </a:r>
-            <a:endParaRPr lang="en-US" sz="1600" dirty="0"/>
-          </a:p>
-        </p:txBody>
-      </p:sp>
-      <p:sp>
-        <p:nvSpPr>
-          <p:cNvPr id="12" name="Text 10"/>
-          <p:cNvSpPr/>
-          <p:nvPr/>
-        </p:nvSpPr>
-        <p:spPr>
-          <a:xfrm>
-            <a:off x="731520" y="5760720"/>
+              <a:t>- Scale-Out 超過時は測定限界表示</a:t>
+            </a:r>
+            <a:endParaRPr lang="en-US" sz="1600" dirty="0"/>
+          </a:p>
+        </p:txBody>
+      </p:sp>
+      <p:sp>
+        <p:nvSpPr>
+          <p:cNvPr id="11" name="Text 9"/>
+          <p:cNvSpPr/>
+          <p:nvPr/>
+        </p:nvSpPr>
+        <p:spPr>
+          <a:xfrm>
+            <a:off x="731520" y="5303520"/>
             <a:ext cx="7680960" cy="457200"/>
           </a:xfrm>
           <a:prstGeom prst="rect">
@@ -5358,52 +5462,15 @@
                   <a:srgbClr val="374151"/>
                 </a:solidFill>
               </a:rPr>
-              <a:t>- 離断例：患側ARTはIPSI/CONT欠如、健側CONT閾値上昇</a:t>
-            </a:r>
-            <a:endParaRPr lang="en-US" sz="1600" dirty="0"/>
-          </a:p>
-        </p:txBody>
-      </p:sp>
-      <p:sp>
-        <p:nvSpPr>
-          <p:cNvPr id="13" name="Text 11"/>
-          <p:cNvSpPr/>
-          <p:nvPr/>
-        </p:nvSpPr>
-        <p:spPr>
-          <a:xfrm>
-            <a:off x="731520" y="6217920"/>
-            <a:ext cx="7680960" cy="457200"/>
-          </a:xfrm>
-          <a:prstGeom prst="rect">
-            <a:avLst/>
-          </a:prstGeom>
-          <a:noFill/>
-          <a:ln/>
-        </p:spPr>
-        <p:txBody>
-          <a:bodyPr wrap="square" rtlCol="0" anchor="ctr"/>
-          <a:lstStyle/>
-          <a:p>
-            <a:pPr algn="l" marL="342900" indent="-342900">
-              <a:buSzPct val="100000"/>
-              <a:buChar char="•"/>
-            </a:pPr>
-            <a:r>
-              <a:rPr lang="en-US" sz="1600" dirty="0">
-                <a:solidFill>
-                  <a:srgbClr val="374151"/>
-                </a:solidFill>
-              </a:rPr>
-              <a:t>- Tym 縦軸はコンプライアンス&gt;2.0mLで自動的に5.0mLへ拡張</a:t>
-            </a:r>
-            <a:endParaRPr lang="en-US" sz="1600" dirty="0"/>
-          </a:p>
-        </p:txBody>
-      </p:sp>
-      <p:sp>
-        <p:nvSpPr>
-          <p:cNvPr id="14" name="Text 12"/>
+              <a:t>- 左右差が大きくなり過ぎないようガード</a:t>
+            </a:r>
+            <a:endParaRPr lang="en-US" sz="1600" dirty="0"/>
+          </a:p>
+        </p:txBody>
+      </p:sp>
+      <p:sp>
+        <p:nvSpPr>
+          <p:cNvPr id="12" name="Text 10"/>
           <p:cNvSpPr/>
           <p:nvPr/>
         </p:nvSpPr>
@@ -5499,7 +5566,7 @@
                   <a:srgbClr val="1F2937"/>
                 </a:solidFill>
               </a:rPr>
-              <a:t>マスキング訓練フロー</a:t>
+              <a:t>BC測定 &amp; ABG管理</a:t>
             </a:r>
             <a:endParaRPr lang="en-US" sz="3200" dirty="0"/>
           </a:p>
@@ -5535,7 +5602,7 @@
                   <a:srgbClr val="374151"/>
                 </a:solidFill>
               </a:rPr>
-              <a:t>マスキング訓練フロー</a:t>
+              <a:t>BC測定 &amp; ABG管理</a:t>
             </a:r>
             <a:endParaRPr lang="en-US" sz="1600" dirty="0"/>
           </a:p>
@@ -5571,7 +5638,7 @@
                   <a:srgbClr val="374151"/>
                 </a:solidFill>
               </a:rPr>
-              <a:t>手順再現</a:t>
+              <a:t>BC値生成</a:t>
             </a:r>
             <a:endParaRPr lang="en-US" sz="1600" dirty="0"/>
           </a:p>
@@ -5586,186 +5653,6 @@
         <p:spPr>
           <a:xfrm>
             <a:off x="731520" y="2560320"/>
-            <a:ext cx="7680960" cy="457200"/>
-          </a:xfrm>
-          <a:prstGeom prst="rect">
-            <a:avLst/>
-          </a:prstGeom>
-          <a:noFill/>
-          <a:ln/>
-        </p:spPr>
-        <p:txBody>
-          <a:bodyPr wrap="square" rtlCol="0" anchor="ctr"/>
-          <a:lstStyle/>
-          <a:p>
-            <a:pPr algn="l" indent="0" marL="0">
-              <a:buNone/>
-            </a:pPr>
-            <a:r>
-              <a:rPr lang="en-US" sz="1600" dirty="0">
-                <a:solidFill>
-                  <a:srgbClr val="374151"/>
-                </a:solidFill>
-              </a:rPr>
-              <a:t>1. 擬似患者のオージオグラム提示</a:t>
-            </a:r>
-            <a:endParaRPr lang="en-US" sz="1600" dirty="0"/>
-          </a:p>
-        </p:txBody>
-      </p:sp>
-      <p:sp>
-        <p:nvSpPr>
-          <p:cNvPr id="6" name="Text 4"/>
-          <p:cNvSpPr/>
-          <p:nvPr/>
-        </p:nvSpPr>
-        <p:spPr>
-          <a:xfrm>
-            <a:off x="731520" y="3017520"/>
-            <a:ext cx="7680960" cy="457200"/>
-          </a:xfrm>
-          <a:prstGeom prst="rect">
-            <a:avLst/>
-          </a:prstGeom>
-          <a:noFill/>
-          <a:ln/>
-        </p:spPr>
-        <p:txBody>
-          <a:bodyPr wrap="square" rtlCol="0" anchor="ctr"/>
-          <a:lstStyle/>
-          <a:p>
-            <a:pPr algn="l" indent="0" marL="0">
-              <a:buNone/>
-            </a:pPr>
-            <a:r>
-              <a:rPr lang="en-US" sz="1600" dirty="0">
-                <a:solidFill>
-                  <a:srgbClr val="374151"/>
-                </a:solidFill>
-              </a:rPr>
-              <a:t>2. 受講者がマスキングレベルを入力</a:t>
-            </a:r>
-            <a:endParaRPr lang="en-US" sz="1600" dirty="0"/>
-          </a:p>
-        </p:txBody>
-      </p:sp>
-      <p:sp>
-        <p:nvSpPr>
-          <p:cNvPr id="7" name="Text 5"/>
-          <p:cNvSpPr/>
-          <p:nvPr/>
-        </p:nvSpPr>
-        <p:spPr>
-          <a:xfrm>
-            <a:off x="731520" y="3474720"/>
-            <a:ext cx="7680960" cy="457200"/>
-          </a:xfrm>
-          <a:prstGeom prst="rect">
-            <a:avLst/>
-          </a:prstGeom>
-          <a:noFill/>
-          <a:ln/>
-        </p:spPr>
-        <p:txBody>
-          <a:bodyPr wrap="square" rtlCol="0" anchor="ctr"/>
-          <a:lstStyle/>
-          <a:p>
-            <a:pPr algn="l" indent="0" marL="0">
-              <a:buNone/>
-            </a:pPr>
-            <a:r>
-              <a:rPr lang="en-US" sz="1600" dirty="0">
-                <a:solidFill>
-                  <a:srgbClr val="374151"/>
-                </a:solidFill>
-              </a:rPr>
-              <a:t>3. システムが適否を判定し、必要なら補正値のヒントを提示</a:t>
-            </a:r>
-            <a:endParaRPr lang="en-US" sz="1600" dirty="0"/>
-          </a:p>
-        </p:txBody>
-      </p:sp>
-      <p:sp>
-        <p:nvSpPr>
-          <p:cNvPr id="8" name="Text 6"/>
-          <p:cNvSpPr/>
-          <p:nvPr/>
-        </p:nvSpPr>
-        <p:spPr>
-          <a:xfrm>
-            <a:off x="731520" y="3931920"/>
-            <a:ext cx="7680960" cy="457200"/>
-          </a:xfrm>
-          <a:prstGeom prst="rect">
-            <a:avLst/>
-          </a:prstGeom>
-          <a:noFill/>
-          <a:ln/>
-        </p:spPr>
-        <p:txBody>
-          <a:bodyPr wrap="square" rtlCol="0" anchor="ctr"/>
-          <a:lstStyle/>
-          <a:p>
-            <a:pPr algn="l" indent="0" marL="0">
-              <a:buNone/>
-            </a:pPr>
-            <a:r>
-              <a:rPr lang="en-US" sz="1600" dirty="0">
-                <a:solidFill>
-                  <a:srgbClr val="374151"/>
-                </a:solidFill>
-              </a:rPr>
-              <a:t>4. 誤差・根拠をフィードバックし、判断ロジックを可視化</a:t>
-            </a:r>
-            <a:endParaRPr lang="en-US" sz="1600" dirty="0"/>
-          </a:p>
-        </p:txBody>
-      </p:sp>
-      <p:sp>
-        <p:nvSpPr>
-          <p:cNvPr id="9" name="Text 7"/>
-          <p:cNvSpPr/>
-          <p:nvPr/>
-        </p:nvSpPr>
-        <p:spPr>
-          <a:xfrm>
-            <a:off x="731520" y="4389120"/>
-            <a:ext cx="7680960" cy="457200"/>
-          </a:xfrm>
-          <a:prstGeom prst="rect">
-            <a:avLst/>
-          </a:prstGeom>
-          <a:noFill/>
-          <a:ln/>
-        </p:spPr>
-        <p:txBody>
-          <a:bodyPr wrap="square" rtlCol="0" anchor="ctr"/>
-          <a:lstStyle/>
-          <a:p>
-            <a:pPr algn="l" indent="0" marL="0">
-              <a:buNone/>
-            </a:pPr>
-            <a:r>
-              <a:rPr lang="en-US" sz="1600" dirty="0">
-                <a:solidFill>
-                  <a:srgbClr val="374151"/>
-                </a:solidFill>
-              </a:rPr>
-              <a:t>特徴</a:t>
-            </a:r>
-            <a:endParaRPr lang="en-US" sz="1600" dirty="0"/>
-          </a:p>
-        </p:txBody>
-      </p:sp>
-      <p:sp>
-        <p:nvSpPr>
-          <p:cNvPr id="10" name="Text 8"/>
-          <p:cNvSpPr/>
-          <p:nvPr/>
-        </p:nvSpPr>
-        <p:spPr>
-          <a:xfrm>
-            <a:off x="731520" y="4846320"/>
             <a:ext cx="7680960" cy="457200"/>
           </a:xfrm>
           <a:prstGeom prst="rect">
@@ -5788,21 +5675,21 @@
                   <a:srgbClr val="374151"/>
                 </a:solidFill>
               </a:rPr>
-              <a:t>- スイープ操作は省き、マスキングレベル決定に集中</a:t>
-            </a:r>
-            <a:endParaRPr lang="en-US" sz="1600" dirty="0"/>
-          </a:p>
-        </p:txBody>
-      </p:sp>
-      <p:sp>
-        <p:nvSpPr>
-          <p:cNvPr id="11" name="Text 9"/>
-          <p:cNvSpPr/>
-          <p:nvPr/>
-        </p:nvSpPr>
-        <p:spPr>
-          <a:xfrm>
-            <a:off x="731520" y="5303520"/>
+              <a:t>- ランダム揺らぎ（±6dB／5dB刻み）</a:t>
+            </a:r>
+            <a:endParaRPr lang="en-US" sz="1600" dirty="0"/>
+          </a:p>
+        </p:txBody>
+      </p:sp>
+      <p:sp>
+        <p:nvSpPr>
+          <p:cNvPr id="6" name="Text 4"/>
+          <p:cNvSpPr/>
+          <p:nvPr/>
+        </p:nvSpPr>
+        <p:spPr>
+          <a:xfrm>
+            <a:off x="731520" y="3017520"/>
             <a:ext cx="7680960" cy="457200"/>
           </a:xfrm>
           <a:prstGeom prst="rect">
@@ -5825,21 +5712,21 @@
                   <a:srgbClr val="374151"/>
                 </a:solidFill>
               </a:rPr>
-              <a:t>- 右左／患側健側の切り替えやクロスヒアリング警告を再現</a:t>
-            </a:r>
-            <a:endParaRPr lang="en-US" sz="1600" dirty="0"/>
-          </a:p>
-        </p:txBody>
-      </p:sp>
-      <p:sp>
-        <p:nvSpPr>
-          <p:cNvPr id="12" name="Text 10"/>
-          <p:cNvSpPr/>
-          <p:nvPr/>
-        </p:nvSpPr>
-        <p:spPr>
-          <a:xfrm>
-            <a:off x="731520" y="5760720"/>
+              <a:t>- 伝音性の場合は最小 ABG を確保</a:t>
+            </a:r>
+            <a:endParaRPr lang="en-US" sz="1600" dirty="0"/>
+          </a:p>
+        </p:txBody>
+      </p:sp>
+      <p:sp>
+        <p:nvSpPr>
+          <p:cNvPr id="7" name="Text 5"/>
+          <p:cNvSpPr/>
+          <p:nvPr/>
+        </p:nvSpPr>
+        <p:spPr>
+          <a:xfrm>
+            <a:off x="731520" y="3474720"/>
             <a:ext cx="7680960" cy="457200"/>
           </a:xfrm>
           <a:prstGeom prst="rect">
@@ -5862,15 +5749,162 @@
                   <a:srgbClr val="374151"/>
                 </a:solidFill>
               </a:rPr>
-              <a:t>- 反復で閾値設定ルールが自然に身に付く</a:t>
-            </a:r>
-            <a:endParaRPr lang="en-US" sz="1600" dirty="0"/>
-          </a:p>
-        </p:txBody>
-      </p:sp>
-      <p:sp>
-        <p:nvSpPr>
-          <p:cNvPr id="13" name="Text 11"/>
+              <a:t>- 正常・SNHL は -10dB ≤ AC-BC ≤ +5dB</a:t>
+            </a:r>
+            <a:endParaRPr lang="en-US" sz="1600" dirty="0"/>
+          </a:p>
+        </p:txBody>
+      </p:sp>
+      <p:sp>
+        <p:nvSpPr>
+          <p:cNvPr id="8" name="Text 6"/>
+          <p:cNvSpPr/>
+          <p:nvPr/>
+        </p:nvSpPr>
+        <p:spPr>
+          <a:xfrm>
+            <a:off x="731520" y="3931920"/>
+            <a:ext cx="7680960" cy="457200"/>
+          </a:xfrm>
+          <a:prstGeom prst="rect">
+            <a:avLst/>
+          </a:prstGeom>
+          <a:noFill/>
+          <a:ln/>
+        </p:spPr>
+        <p:txBody>
+          <a:bodyPr wrap="square" rtlCol="0" anchor="ctr"/>
+          <a:lstStyle/>
+          <a:p>
+            <a:pPr algn="l" indent="0" marL="0">
+              <a:buNone/>
+            </a:pPr>
+            <a:r>
+              <a:rPr lang="en-US" sz="1600" dirty="0">
+                <a:solidFill>
+                  <a:srgbClr val="374151"/>
+                </a:solidFill>
+              </a:rPr>
+              <a:t>測定時の確認ポイント</a:t>
+            </a:r>
+            <a:endParaRPr lang="en-US" sz="1600" dirty="0"/>
+          </a:p>
+        </p:txBody>
+      </p:sp>
+      <p:sp>
+        <p:nvSpPr>
+          <p:cNvPr id="9" name="Text 7"/>
+          <p:cNvSpPr/>
+          <p:nvPr/>
+        </p:nvSpPr>
+        <p:spPr>
+          <a:xfrm>
+            <a:off x="731520" y="4389120"/>
+            <a:ext cx="7680960" cy="457200"/>
+          </a:xfrm>
+          <a:prstGeom prst="rect">
+            <a:avLst/>
+          </a:prstGeom>
+          <a:noFill/>
+          <a:ln/>
+        </p:spPr>
+        <p:txBody>
+          <a:bodyPr wrap="square" rtlCol="0" anchor="ctr"/>
+          <a:lstStyle/>
+          <a:p>
+            <a:pPr algn="l" marL="342900" indent="-342900">
+              <a:buSzPct val="100000"/>
+              <a:buChar char="•"/>
+            </a:pPr>
+            <a:r>
+              <a:rPr lang="en-US" sz="1600" dirty="0">
+                <a:solidFill>
+                  <a:srgbClr val="374151"/>
+                </a:solidFill>
+              </a:rPr>
+              <a:t>- 仮閾値と AC の差から ABG を算出</a:t>
+            </a:r>
+            <a:endParaRPr lang="en-US" sz="1600" dirty="0"/>
+          </a:p>
+        </p:txBody>
+      </p:sp>
+      <p:sp>
+        <p:nvSpPr>
+          <p:cNvPr id="10" name="Text 8"/>
+          <p:cNvSpPr/>
+          <p:nvPr/>
+        </p:nvSpPr>
+        <p:spPr>
+          <a:xfrm>
+            <a:off x="731520" y="4846320"/>
+            <a:ext cx="7680960" cy="457200"/>
+          </a:xfrm>
+          <a:prstGeom prst="rect">
+            <a:avLst/>
+          </a:prstGeom>
+          <a:noFill/>
+          <a:ln/>
+        </p:spPr>
+        <p:txBody>
+          <a:bodyPr wrap="square" rtlCol="0" anchor="ctr"/>
+          <a:lstStyle/>
+          <a:p>
+            <a:pPr algn="l" marL="342900" indent="-342900">
+              <a:buSzPct val="100000"/>
+              <a:buChar char="•"/>
+            </a:pPr>
+            <a:r>
+              <a:rPr lang="en-US" sz="1600" dirty="0">
+                <a:solidFill>
+                  <a:srgbClr val="374151"/>
+                </a:solidFill>
+              </a:rPr>
+              <a:t>- 最小 ABG未満なら AC を補正</a:t>
+            </a:r>
+            <a:endParaRPr lang="en-US" sz="1600" dirty="0"/>
+          </a:p>
+        </p:txBody>
+      </p:sp>
+      <p:sp>
+        <p:nvSpPr>
+          <p:cNvPr id="11" name="Text 9"/>
+          <p:cNvSpPr/>
+          <p:nvPr/>
+        </p:nvSpPr>
+        <p:spPr>
+          <a:xfrm>
+            <a:off x="731520" y="5303520"/>
+            <a:ext cx="7680960" cy="457200"/>
+          </a:xfrm>
+          <a:prstGeom prst="rect">
+            <a:avLst/>
+          </a:prstGeom>
+          <a:noFill/>
+          <a:ln/>
+        </p:spPr>
+        <p:txBody>
+          <a:bodyPr wrap="square" rtlCol="0" anchor="ctr"/>
+          <a:lstStyle/>
+          <a:p>
+            <a:pPr algn="l" marL="342900" indent="-342900">
+              <a:buSzPct val="100000"/>
+              <a:buChar char="•"/>
+            </a:pPr>
+            <a:r>
+              <a:rPr lang="en-US" sz="1600" dirty="0">
+                <a:solidFill>
+                  <a:srgbClr val="374151"/>
+                </a:solidFill>
+              </a:rPr>
+              <a:t>- 40dB 超の ABG は自動的に抑制</a:t>
+            </a:r>
+            <a:endParaRPr lang="en-US" sz="1600" dirty="0"/>
+          </a:p>
+        </p:txBody>
+      </p:sp>
+      <p:sp>
+        <p:nvSpPr>
+          <p:cNvPr id="12" name="Text 10"/>
           <p:cNvSpPr/>
           <p:nvPr/>
         </p:nvSpPr>
@@ -5966,7 +6000,7 @@
                   <a:srgbClr val="1F2937"/>
                 </a:solidFill>
               </a:rPr>
-              <a:t>学習者UIハイライト</a:t>
+              <a:t>マスキング要否判定ロジック</a:t>
             </a:r>
             <a:endParaRPr lang="en-US" sz="3200" dirty="0"/>
           </a:p>
@@ -6002,7 +6036,7 @@
                   <a:srgbClr val="374151"/>
                 </a:solidFill>
               </a:rPr>
-              <a:t>学習者UIハイライト</a:t>
+              <a:t>マスキング要否判定ロジック</a:t>
             </a:r>
             <a:endParaRPr lang="en-US" sz="1600" dirty="0"/>
           </a:p>
@@ -6038,7 +6072,7 @@
                   <a:srgbClr val="374151"/>
                 </a:solidFill>
               </a:rPr>
-              <a:t>主要画面要素</a:t>
+              <a:t>条件評価</a:t>
             </a:r>
             <a:endParaRPr lang="en-US" sz="1600" dirty="0"/>
           </a:p>
@@ -6075,7 +6109,7 @@
                   <a:srgbClr val="374151"/>
                 </a:solidFill>
               </a:rPr>
-              <a:t>- Audiogram ビューとマスキング入力パネル</a:t>
+              <a:t>- ABG が疾患別最小値以上</a:t>
             </a:r>
             <a:endParaRPr lang="en-US" sz="1600" dirty="0"/>
           </a:p>
@@ -6112,7 +6146,7 @@
                   <a:srgbClr val="374151"/>
                 </a:solidFill>
               </a:rPr>
-              <a:t>- Tym／ART／DPOAE タブで補助検査を確認</a:t>
+              <a:t>- 左右差が IA を超える見込み</a:t>
             </a:r>
             <a:endParaRPr lang="en-US" sz="1600" dirty="0"/>
           </a:p>
@@ -6149,7 +6183,7 @@
                   <a:srgbClr val="374151"/>
                 </a:solidFill>
               </a:rPr>
-              <a:t>- 答え合わせカードに原プロファイル名（例：SNHL_Sudden）を表示</a:t>
+              <a:t>- テスト耳の閾値がマスキングノイズで覆われないか確認</a:t>
             </a:r>
             <a:endParaRPr lang="en-US" sz="1600" dirty="0"/>
           </a:p>
@@ -6164,6 +6198,42 @@
         <p:spPr>
           <a:xfrm>
             <a:off x="731520" y="3931920"/>
+            <a:ext cx="7680960" cy="457200"/>
+          </a:xfrm>
+          <a:prstGeom prst="rect">
+            <a:avLst/>
+          </a:prstGeom>
+          <a:noFill/>
+          <a:ln/>
+        </p:spPr>
+        <p:txBody>
+          <a:bodyPr wrap="square" rtlCol="0" anchor="ctr"/>
+          <a:lstStyle/>
+          <a:p>
+            <a:pPr algn="l" indent="0" marL="0">
+              <a:buNone/>
+            </a:pPr>
+            <a:r>
+              <a:rPr lang="en-US" sz="1600" dirty="0">
+                <a:solidFill>
+                  <a:srgbClr val="374151"/>
+                </a:solidFill>
+              </a:rPr>
+              <a:t>システムのサポート</a:t>
+            </a:r>
+            <a:endParaRPr lang="en-US" sz="1600" dirty="0"/>
+          </a:p>
+        </p:txBody>
+      </p:sp>
+      <p:sp>
+        <p:nvSpPr>
+          <p:cNvPr id="9" name="Text 7"/>
+          <p:cNvSpPr/>
+          <p:nvPr/>
+        </p:nvSpPr>
+        <p:spPr>
+          <a:xfrm>
+            <a:off x="731520" y="4389120"/>
             <a:ext cx="7680960" cy="457200"/>
           </a:xfrm>
           <a:prstGeom prst="rect">
@@ -6186,43 +6256,7 @@
                   <a:srgbClr val="374151"/>
                 </a:solidFill>
               </a:rPr>
-              <a:t>- 臨床メモ／ヒント表示で判断根拠を解説</a:t>
-            </a:r>
-            <a:endParaRPr lang="en-US" sz="1600" dirty="0"/>
-          </a:p>
-        </p:txBody>
-      </p:sp>
-      <p:sp>
-        <p:nvSpPr>
-          <p:cNvPr id="9" name="Text 7"/>
-          <p:cNvSpPr/>
-          <p:nvPr/>
-        </p:nvSpPr>
-        <p:spPr>
-          <a:xfrm>
-            <a:off x="731520" y="4389120"/>
-            <a:ext cx="7680960" cy="457200"/>
-          </a:xfrm>
-          <a:prstGeom prst="rect">
-            <a:avLst/>
-          </a:prstGeom>
-          <a:noFill/>
-          <a:ln/>
-        </p:spPr>
-        <p:txBody>
-          <a:bodyPr wrap="square" rtlCol="0" anchor="ctr"/>
-          <a:lstStyle/>
-          <a:p>
-            <a:pPr algn="l" indent="0" marL="0">
-              <a:buNone/>
-            </a:pPr>
-            <a:r>
-              <a:rPr lang="en-US" sz="1600" dirty="0">
-                <a:solidFill>
-                  <a:srgbClr val="374151"/>
-                </a:solidFill>
-              </a:rPr>
-              <a:t>インタラクション</a:t>
+              <a:t>- 条件を満たす周波数をハイライト</a:t>
             </a:r>
             <a:endParaRPr lang="en-US" sz="1600" dirty="0"/>
           </a:p>
@@ -6259,7 +6293,7 @@
                   <a:srgbClr val="374151"/>
                 </a:solidFill>
               </a:rPr>
-              <a:t>- 入力値に応じてリアルタイムに結果を更新</a:t>
+              <a:t>- 必要なマスキング操作を指示</a:t>
             </a:r>
             <a:endParaRPr lang="en-US" sz="1600" dirty="0"/>
           </a:p>
@@ -6296,7 +6330,7 @@
                   <a:srgbClr val="374151"/>
                 </a:solidFill>
               </a:rPr>
-              <a:t>- 誤判定時は原因と正解の幅を提示</a:t>
+              <a:t>- 判定根拠をツールチップで提示</a:t>
             </a:r>
             <a:endParaRPr lang="en-US" sz="1600" dirty="0"/>
           </a:p>
@@ -6305,43 +6339,6 @@
       <p:sp>
         <p:nvSpPr>
           <p:cNvPr id="12" name="Text 10"/>
-          <p:cNvSpPr/>
-          <p:nvPr/>
-        </p:nvSpPr>
-        <p:spPr>
-          <a:xfrm>
-            <a:off x="731520" y="5760720"/>
-            <a:ext cx="7680960" cy="457200"/>
-          </a:xfrm>
-          <a:prstGeom prst="rect">
-            <a:avLst/>
-          </a:prstGeom>
-          <a:noFill/>
-          <a:ln/>
-        </p:spPr>
-        <p:txBody>
-          <a:bodyPr wrap="square" rtlCol="0" anchor="ctr"/>
-          <a:lstStyle/>
-          <a:p>
-            <a:pPr algn="l" marL="342900" indent="-342900">
-              <a:buSzPct val="100000"/>
-              <a:buChar char="•"/>
-            </a:pPr>
-            <a:r>
-              <a:rPr lang="en-US" sz="1600" dirty="0">
-                <a:solidFill>
-                  <a:srgbClr val="374151"/>
-                </a:solidFill>
-              </a:rPr>
-              <a:t>- 症例履歴を蓄積し、苦手傾向を分析可能</a:t>
-            </a:r>
-            <a:endParaRPr lang="en-US" sz="1600" dirty="0"/>
-          </a:p>
-        </p:txBody>
-      </p:sp>
-      <p:sp>
-        <p:nvSpPr>
-          <p:cNvPr id="13" name="Text 11"/>
           <p:cNvSpPr/>
           <p:nvPr/>
         </p:nvSpPr>
@@ -6437,7 +6434,7 @@
                   <a:srgbClr val="1F2937"/>
                 </a:solidFill>
               </a:rPr>
-              <a:t>臨床ルールの組み込み</a:t>
+              <a:t>マスキング量算出</a:t>
             </a:r>
             <a:endParaRPr lang="en-US" sz="3200" dirty="0"/>
           </a:p>
@@ -6473,7 +6470,7 @@
                   <a:srgbClr val="374151"/>
                 </a:solidFill>
               </a:rPr>
-              <a:t>臨床ルールの組み込み</a:t>
+              <a:t>マスキング量算出</a:t>
             </a:r>
             <a:endParaRPr lang="en-US" sz="1600" dirty="0"/>
           </a:p>
@@ -6509,7 +6506,7 @@
                   <a:srgbClr val="374151"/>
                 </a:solidFill>
               </a:rPr>
-              <a:t>Audiogram</a:t>
+              <a:t>推奨計算</a:t>
             </a:r>
             <a:endParaRPr lang="en-US" sz="1600" dirty="0"/>
           </a:p>
@@ -6546,7 +6543,7 @@
                   <a:srgbClr val="374151"/>
                 </a:solidFill>
               </a:rPr>
-              <a:t>- AC/BC 差の上下限・左右相関をルール化</a:t>
+              <a:t>- 気導：TE AC + セーフティマージン - IA</a:t>
             </a:r>
             <a:endParaRPr lang="en-US" sz="1600" dirty="0"/>
           </a:p>
@@ -6583,7 +6580,7 @@
                   <a:srgbClr val="374151"/>
                 </a:solidFill>
               </a:rPr>
-              <a:t>- BC 値のランダム揺らぎで実症例に近いバリエーション</a:t>
+              <a:t>- 骨導：TE BC + セーフティマージン</a:t>
             </a:r>
             <a:endParaRPr lang="en-US" sz="1600" dirty="0"/>
           </a:p>
@@ -6598,42 +6595,6 @@
         <p:spPr>
           <a:xfrm>
             <a:off x="731520" y="3474720"/>
-            <a:ext cx="7680960" cy="457200"/>
-          </a:xfrm>
-          <a:prstGeom prst="rect">
-            <a:avLst/>
-          </a:prstGeom>
-          <a:noFill/>
-          <a:ln/>
-        </p:spPr>
-        <p:txBody>
-          <a:bodyPr wrap="square" rtlCol="0" anchor="ctr"/>
-          <a:lstStyle/>
-          <a:p>
-            <a:pPr algn="l" indent="0" marL="0">
-              <a:buNone/>
-            </a:pPr>
-            <a:r>
-              <a:rPr lang="en-US" sz="1600" dirty="0">
-                <a:solidFill>
-                  <a:srgbClr val="374151"/>
-                </a:solidFill>
-              </a:rPr>
-              <a:t>Tympanogram</a:t>
-            </a:r>
-            <a:endParaRPr lang="en-US" sz="1600" dirty="0"/>
-          </a:p>
-        </p:txBody>
-      </p:sp>
-      <p:sp>
-        <p:nvSpPr>
-          <p:cNvPr id="8" name="Text 6"/>
-          <p:cNvSpPr/>
-          <p:nvPr/>
-        </p:nvSpPr>
-        <p:spPr>
-          <a:xfrm>
-            <a:off x="731520" y="3931920"/>
             <a:ext cx="7680960" cy="457200"/>
           </a:xfrm>
           <a:prstGeom prst="rect">
@@ -6656,7 +6617,43 @@
                   <a:srgbClr val="374151"/>
                 </a:solidFill>
               </a:rPr>
-              <a:t>- 患側のみコンプライアンス上昇／健側は正常値を維持</a:t>
+              <a:t>- セーフティマージンは 10dB を基本</a:t>
+            </a:r>
+            <a:endParaRPr lang="en-US" sz="1600" dirty="0"/>
+          </a:p>
+        </p:txBody>
+      </p:sp>
+      <p:sp>
+        <p:nvSpPr>
+          <p:cNvPr id="8" name="Text 6"/>
+          <p:cNvSpPr/>
+          <p:nvPr/>
+        </p:nvSpPr>
+        <p:spPr>
+          <a:xfrm>
+            <a:off x="731520" y="3931920"/>
+            <a:ext cx="7680960" cy="457200"/>
+          </a:xfrm>
+          <a:prstGeom prst="rect">
+            <a:avLst/>
+          </a:prstGeom>
+          <a:noFill/>
+          <a:ln/>
+        </p:spPr>
+        <p:txBody>
+          <a:bodyPr wrap="square" rtlCol="0" anchor="ctr"/>
+          <a:lstStyle/>
+          <a:p>
+            <a:pPr algn="l" indent="0" marL="0">
+              <a:buNone/>
+            </a:pPr>
+            <a:r>
+              <a:rPr lang="en-US" sz="1600" dirty="0">
+                <a:solidFill>
+                  <a:srgbClr val="374151"/>
+                </a:solidFill>
+              </a:rPr>
+              <a:t>アプリでの表示</a:t>
             </a:r>
             <a:endParaRPr lang="en-US" sz="1600" dirty="0"/>
           </a:p>
@@ -6693,7 +6690,7 @@
                   <a:srgbClr val="374151"/>
                 </a:solidFill>
               </a:rPr>
-              <a:t>- コンプライアンス2.0mL超でY軸を自動拡大</a:t>
+              <a:t>- 推奨値と設定欄を並列表示</a:t>
             </a:r>
             <a:endParaRPr lang="en-US" sz="1600" dirty="0"/>
           </a:p>
@@ -6708,42 +6705,6 @@
         <p:spPr>
           <a:xfrm>
             <a:off x="731520" y="4846320"/>
-            <a:ext cx="7680960" cy="457200"/>
-          </a:xfrm>
-          <a:prstGeom prst="rect">
-            <a:avLst/>
-          </a:prstGeom>
-          <a:noFill/>
-          <a:ln/>
-        </p:spPr>
-        <p:txBody>
-          <a:bodyPr wrap="square" rtlCol="0" anchor="ctr"/>
-          <a:lstStyle/>
-          <a:p>
-            <a:pPr algn="l" indent="0" marL="0">
-              <a:buNone/>
-            </a:pPr>
-            <a:r>
-              <a:rPr lang="en-US" sz="1600" dirty="0">
-                <a:solidFill>
-                  <a:srgbClr val="374151"/>
-                </a:solidFill>
-              </a:rPr>
-              <a:t>ART・DPOAE</a:t>
-            </a:r>
-            <a:endParaRPr lang="en-US" sz="1600" dirty="0"/>
-          </a:p>
-        </p:txBody>
-      </p:sp>
-      <p:sp>
-        <p:nvSpPr>
-          <p:cNvPr id="11" name="Text 9"/>
-          <p:cNvSpPr/>
-          <p:nvPr/>
-        </p:nvSpPr>
-        <p:spPr>
-          <a:xfrm>
-            <a:off x="731520" y="5303520"/>
             <a:ext cx="7680960" cy="457200"/>
           </a:xfrm>
           <a:prstGeom prst="rect">
@@ -6766,21 +6727,21 @@
                   <a:srgbClr val="374151"/>
                 </a:solidFill>
               </a:rPr>
-              <a:t>- 病態ごとの反射欠如／閾値上昇／PASS/REFER条件を定義</a:t>
-            </a:r>
-            <a:endParaRPr lang="en-US" sz="1600" dirty="0"/>
-          </a:p>
-        </p:txBody>
-      </p:sp>
-      <p:sp>
-        <p:nvSpPr>
-          <p:cNvPr id="12" name="Text 10"/>
-          <p:cNvSpPr/>
-          <p:nvPr/>
-        </p:nvSpPr>
-        <p:spPr>
-          <a:xfrm>
-            <a:off x="731520" y="5760720"/>
+              <a:t>- 入力値と推奨値の差をリアルタイムに判定</a:t>
+            </a:r>
+            <a:endParaRPr lang="en-US" sz="1600" dirty="0"/>
+          </a:p>
+        </p:txBody>
+      </p:sp>
+      <p:sp>
+        <p:nvSpPr>
+          <p:cNvPr id="11" name="Text 9"/>
+          <p:cNvSpPr/>
+          <p:nvPr/>
+        </p:nvSpPr>
+        <p:spPr>
+          <a:xfrm>
+            <a:off x="731520" y="5303520"/>
             <a:ext cx="7680960" cy="457200"/>
           </a:xfrm>
           <a:prstGeom prst="rect">
@@ -6803,15 +6764,15 @@
                   <a:srgbClr val="374151"/>
                 </a:solidFill>
               </a:rPr>
-              <a:t>- 補助検査間の矛盾を自動検出し修正</a:t>
-            </a:r>
-            <a:endParaRPr lang="en-US" sz="1600" dirty="0"/>
-          </a:p>
-        </p:txBody>
-      </p:sp>
-      <p:sp>
-        <p:nvSpPr>
-          <p:cNvPr id="13" name="Text 11"/>
+              <a:t>- 適正範囲／過小／過大を色分け</a:t>
+            </a:r>
+            <a:endParaRPr lang="en-US" sz="1600" dirty="0"/>
+          </a:p>
+        </p:txBody>
+      </p:sp>
+      <p:sp>
+        <p:nvSpPr>
+          <p:cNvPr id="12" name="Text 10"/>
           <p:cNvSpPr/>
           <p:nvPr/>
         </p:nvSpPr>
@@ -6907,7 +6868,7 @@
                   <a:srgbClr val="1F2937"/>
                 </a:solidFill>
               </a:rPr>
-              <a:t>臨床教育へのインパクト</a:t>
+              <a:t>クロスヒアリング監視</a:t>
             </a:r>
             <a:endParaRPr lang="en-US" sz="3200" dirty="0"/>
           </a:p>
@@ -6943,7 +6904,7 @@
                   <a:srgbClr val="374151"/>
                 </a:solidFill>
               </a:rPr>
-              <a:t>臨床教育へのインパクト</a:t>
+              <a:t>クロスヒアリング監視</a:t>
             </a:r>
             <a:endParaRPr lang="en-US" sz="1600" dirty="0"/>
           </a:p>
@@ -6979,7 +6940,7 @@
                   <a:srgbClr val="374151"/>
                 </a:solidFill>
               </a:rPr>
-              <a:t>教育効果</a:t>
+              <a:t>監視ポイント</a:t>
             </a:r>
             <a:endParaRPr lang="en-US" sz="1600" dirty="0"/>
           </a:p>
@@ -7016,7 +6977,7 @@
                   <a:srgbClr val="374151"/>
                 </a:solidFill>
               </a:rPr>
-              <a:t>- マスキング判断を数多く体験し臨床感覚を養成</a:t>
+              <a:t>- マスキング下で意図しない応答がないか</a:t>
             </a:r>
             <a:endParaRPr lang="en-US" sz="1600" dirty="0"/>
           </a:p>
@@ -7053,7 +7014,7 @@
                   <a:srgbClr val="374151"/>
                 </a:solidFill>
               </a:rPr>
-              <a:t>- 症例ごとに補助検査を確認し総合的な診断思考を訓練</a:t>
+              <a:t>- 対側閾値との関係から cross-check</a:t>
             </a:r>
             <a:endParaRPr lang="en-US" sz="1600" dirty="0"/>
           </a:p>
@@ -7090,7 +7051,7 @@
                   <a:srgbClr val="374151"/>
                 </a:solidFill>
               </a:rPr>
-              <a:t>- ルールベースのフィードバックで理解を深化</a:t>
+              <a:t>- BC 測定時の反対耳への伝播に注意</a:t>
             </a:r>
             <a:endParaRPr lang="en-US" sz="1600" dirty="0"/>
           </a:p>
@@ -7126,7 +7087,7 @@
                   <a:srgbClr val="374151"/>
                 </a:solidFill>
               </a:rPr>
-              <a:t>運用メリット</a:t>
+              <a:t>システム挙動</a:t>
             </a:r>
             <a:endParaRPr lang="en-US" sz="1600" dirty="0"/>
           </a:p>
@@ -7163,7 +7124,7 @@
                   <a:srgbClr val="374151"/>
                 </a:solidFill>
               </a:rPr>
-              <a:t>- Webブラウザのみで利用、設備投資不要</a:t>
+              <a:t>- 応答パターンからクロスヒアリング疑いを検出</a:t>
             </a:r>
             <a:endParaRPr lang="en-US" sz="1600" dirty="0"/>
           </a:p>
@@ -7200,7 +7161,7 @@
                   <a:srgbClr val="374151"/>
                 </a:solidFill>
               </a:rPr>
-              <a:t>- 学習ログ管理で指導者が進捗を把握</a:t>
+              <a:t>- 指摘時は追加マスキングの提案を表示</a:t>
             </a:r>
             <a:endParaRPr lang="en-US" sz="1600" dirty="0"/>
           </a:p>
@@ -7237,7 +7198,7 @@
                   <a:srgbClr val="374151"/>
                 </a:solidFill>
               </a:rPr>
-              <a:t>- 症例生成の重み付けを排除し、広範な病態を均等学習</a:t>
+              <a:t>- 学習者に判断理由をフィードバック</a:t>
             </a:r>
             <a:endParaRPr lang="en-US" sz="1600" dirty="0"/>
           </a:p>

</xml_diff>

<commit_message>
Clarify learner roles in masking workflow
</commit_message>
<xml_diff>
--- a/HearSim_マスキング訓練プレゼン.pptx
+++ b/HearSim_マスキング訓練プレゼン.pptx
@@ -2654,7 +2654,7 @@
                   <a:srgbClr val="374151"/>
                 </a:solidFill>
               </a:rPr>
-              <a:t>  Start[AI症例生成] --&gt; ACGen[AC初期値・補助検査生成]</a:t>
+              <a:t>  subgraph AI[AIの役割]</a:t>
             </a:r>
             <a:endParaRPr lang="en-US" sz="1600" dirty="0"/>
           </a:p>
@@ -2690,7 +2690,7 @@
                   <a:srgbClr val="374151"/>
                 </a:solidFill>
               </a:rPr>
-              <a:t>  ACGen --&gt; ACMeasure[AC測定 5dB下降法]</a:t>
+              <a:t>    Start[症例生成] --&gt; ACGen[AC/BC初期値と補助検査生成]</a:t>
             </a:r>
             <a:endParaRPr lang="en-US" sz="1600" dirty="0"/>
           </a:p>
@@ -2726,7 +2726,7 @@
                   <a:srgbClr val="374151"/>
                 </a:solidFill>
               </a:rPr>
-              <a:t>  ACMeasure --&gt; BCMeasure[BC測定とABG管理]</a:t>
+              <a:t>    ACGen --&gt; Guidance[判定ガイド・推奨値提示]</a:t>
             </a:r>
             <a:endParaRPr lang="en-US" sz="1600" dirty="0"/>
           </a:p>
@@ -2762,7 +2762,7 @@
                   <a:srgbClr val="374151"/>
                 </a:solidFill>
               </a:rPr>
-              <a:t>  BCMeasure --&gt; MaskCheck[マスキング要否判定]</a:t>
+              <a:t>    Feedback[結果照合・フィードバック] --&gt; Start</a:t>
             </a:r>
             <a:endParaRPr lang="en-US" sz="1600" dirty="0"/>
           </a:p>
@@ -2798,7 +2798,7 @@
                   <a:srgbClr val="374151"/>
                 </a:solidFill>
               </a:rPr>
-              <a:t>  MaskCheck --&gt;|必要| MaskCalc[マスキング量算出]</a:t>
+              <a:t>  end</a:t>
             </a:r>
             <a:endParaRPr lang="en-US" sz="1600" dirty="0"/>
           </a:p>
@@ -2834,7 +2834,7 @@
                   <a:srgbClr val="374151"/>
                 </a:solidFill>
               </a:rPr>
-              <a:t>  MaskCalc --&gt; ApplyMask[マスキング適用と再測定]</a:t>
+              <a:t>  subgraph Learner[受講者の役割]</a:t>
             </a:r>
             <a:endParaRPr lang="en-US" sz="1600" dirty="0"/>
           </a:p>
@@ -2870,7 +2870,7 @@
                   <a:srgbClr val="374151"/>
                 </a:solidFill>
               </a:rPr>
-              <a:t>  ApplyMask --&gt; CrossCheck[クロスヒアリング検出]</a:t>
+              <a:t>    ACMeasure[AC測定 5dB上昇法] --&gt; BCMeasure[BC測定とABG管理]</a:t>
             </a:r>
             <a:endParaRPr lang="en-US" sz="1600" dirty="0"/>
           </a:p>
@@ -2906,7 +2906,7 @@
                   <a:srgbClr val="374151"/>
                 </a:solidFill>
               </a:rPr>
-              <a:t>  CrossCheck --&gt; OverMask[オーバーマスキング監視]</a:t>
+              <a:t>    BCMeasure --&gt; MaskCheck[マスキング要否判定]</a:t>
             </a:r>
             <a:endParaRPr lang="en-US" sz="1600" dirty="0"/>
           </a:p>
@@ -2942,7 +2942,7 @@
                   <a:srgbClr val="374151"/>
                 </a:solidFill>
               </a:rPr>
-              <a:t>  OverMask --&gt; ResultCheck[結果照合・ログ保存]</a:t>
+              <a:t>    MaskCheck --&gt;|必要| MaskCalc[マスキング量算出]</a:t>
             </a:r>
             <a:endParaRPr lang="en-US" sz="1600" dirty="0"/>
           </a:p>
@@ -5279,7 +5279,7 @@
                   <a:srgbClr val="374151"/>
                 </a:solidFill>
               </a:rPr>
-              <a:t>2. 測定者が 5dB下降法で閾値を決定</a:t>
+              <a:t>2. 受講者が 5dB上昇法（聴取不可レベルから 5dB ずつ上げる）で応答を確認</a:t>
             </a:r>
             <a:endParaRPr lang="en-US" sz="1600" dirty="0"/>
           </a:p>
@@ -5822,7 +5822,7 @@
                   <a:srgbClr val="374151"/>
                 </a:solidFill>
               </a:rPr>
-              <a:t>- 仮閾値と AC の差から ABG を算出</a:t>
+              <a:t>- 受講者が上昇法で応答を記録し、仮閾値と AC の差から ABG を算出</a:t>
             </a:r>
             <a:endParaRPr lang="en-US" sz="1600" dirty="0"/>
           </a:p>
@@ -6072,7 +6072,7 @@
                   <a:srgbClr val="374151"/>
                 </a:solidFill>
               </a:rPr>
-              <a:t>条件評価</a:t>
+              <a:t>条件評価（受講者が判断）</a:t>
             </a:r>
             <a:endParaRPr lang="en-US" sz="1600" dirty="0"/>
           </a:p>
@@ -6109,7 +6109,7 @@
                   <a:srgbClr val="374151"/>
                 </a:solidFill>
               </a:rPr>
-              <a:t>- ABG が疾患別最小値以上</a:t>
+              <a:t>- ABG が疾患別最小値以上か</a:t>
             </a:r>
             <a:endParaRPr lang="en-US" sz="1600" dirty="0"/>
           </a:p>
@@ -6146,7 +6146,7 @@
                   <a:srgbClr val="374151"/>
                 </a:solidFill>
               </a:rPr>
-              <a:t>- 左右差が IA を超える見込み</a:t>
+              <a:t>- 左右差が IA を超える見込みか</a:t>
             </a:r>
             <a:endParaRPr lang="en-US" sz="1600" dirty="0"/>
           </a:p>
@@ -6183,7 +6183,7 @@
                   <a:srgbClr val="374151"/>
                 </a:solidFill>
               </a:rPr>
-              <a:t>- テスト耳の閾値がマスキングノイズで覆われないか確認</a:t>
+              <a:t>- テスト耳閾値がマスキングノイズで覆われないか</a:t>
             </a:r>
             <a:endParaRPr lang="en-US" sz="1600" dirty="0"/>
           </a:p>
@@ -6219,7 +6219,7 @@
                   <a:srgbClr val="374151"/>
                 </a:solidFill>
               </a:rPr>
-              <a:t>システムのサポート</a:t>
+              <a:t>システムのサポート（AI）</a:t>
             </a:r>
             <a:endParaRPr lang="en-US" sz="1600" dirty="0"/>
           </a:p>
@@ -6293,7 +6293,7 @@
                   <a:srgbClr val="374151"/>
                 </a:solidFill>
               </a:rPr>
-              <a:t>- 必要なマスキング操作を指示</a:t>
+              <a:t>- 必要なマスキング操作をガイダンス</a:t>
             </a:r>
             <a:endParaRPr lang="en-US" sz="1600" dirty="0"/>
           </a:p>
@@ -6330,7 +6330,7 @@
                   <a:srgbClr val="374151"/>
                 </a:solidFill>
               </a:rPr>
-              <a:t>- 判定根拠をツールチップで提示</a:t>
+              <a:t>- 判定ミス時に根拠をフィードバック</a:t>
             </a:r>
             <a:endParaRPr lang="en-US" sz="1600" dirty="0"/>
           </a:p>
@@ -6506,7 +6506,7 @@
                   <a:srgbClr val="374151"/>
                 </a:solidFill>
               </a:rPr>
-              <a:t>推奨計算</a:t>
+              <a:t>推奨計算（受講者が手計算）</a:t>
             </a:r>
             <a:endParaRPr lang="en-US" sz="1600" dirty="0"/>
           </a:p>
@@ -6617,7 +6617,7 @@
                   <a:srgbClr val="374151"/>
                 </a:solidFill>
               </a:rPr>
-              <a:t>- セーフティマージンは 10dB を基本</a:t>
+              <a:t>- セーフティマージンは 10dB を基準に調整</a:t>
             </a:r>
             <a:endParaRPr lang="en-US" sz="1600" dirty="0"/>
           </a:p>
@@ -6653,7 +6653,7 @@
                   <a:srgbClr val="374151"/>
                 </a:solidFill>
               </a:rPr>
-              <a:t>アプリでの表示</a:t>
+              <a:t>アプリでの表示（AI サポート）</a:t>
             </a:r>
             <a:endParaRPr lang="en-US" sz="1600" dirty="0"/>
           </a:p>
@@ -6727,7 +6727,7 @@
                   <a:srgbClr val="374151"/>
                 </a:solidFill>
               </a:rPr>
-              <a:t>- 入力値と推奨値の差をリアルタイムに判定</a:t>
+              <a:t>- 入力値と推奨値の乖離をリアルタイム判定</a:t>
             </a:r>
             <a:endParaRPr lang="en-US" sz="1600" dirty="0"/>
           </a:p>

</xml_diff>